<commit_message>
updated ppt presentation, only two code examples left
</commit_message>
<xml_diff>
--- a/project-2/Pirple - Project 2.pptx
+++ b/project-2/Pirple - Project 2.pptx
@@ -10,8 +10,11 @@
     <p:sldId id="258" r:id="rId4"/>
     <p:sldId id="260" r:id="rId5"/>
     <p:sldId id="261" r:id="rId6"/>
-    <p:sldId id="259" r:id="rId7"/>
-    <p:sldId id="262" r:id="rId8"/>
+    <p:sldId id="263" r:id="rId7"/>
+    <p:sldId id="259" r:id="rId8"/>
+    <p:sldId id="262" r:id="rId9"/>
+    <p:sldId id="264" r:id="rId10"/>
+    <p:sldId id="265" r:id="rId11"/>
   </p:sldIdLst>
   <p:sldSz cx="12192000" cy="6858000"/>
   <p:notesSz cx="6858000" cy="9144000"/>
@@ -271,7 +274,7 @@
           <a:p>
             <a:fld id="{846CE7D5-CF57-46EF-B807-FDD0502418D4}" type="datetimeFigureOut">
               <a:rPr lang="en-US" smtClean="0"/>
-              <a:t>4/11/2020</a:t>
+              <a:t>4/17/2020</a:t>
             </a:fld>
             <a:endParaRPr lang="en-US"/>
           </a:p>
@@ -453,7 +456,7 @@
           <a:p>
             <a:fld id="{846CE7D5-CF57-46EF-B807-FDD0502418D4}" type="datetimeFigureOut">
               <a:rPr lang="en-US" smtClean="0"/>
-              <a:t>4/11/2020</a:t>
+              <a:t>4/17/2020</a:t>
             </a:fld>
             <a:endParaRPr lang="en-US"/>
           </a:p>
@@ -645,7 +648,7 @@
           <a:p>
             <a:fld id="{846CE7D5-CF57-46EF-B807-FDD0502418D4}" type="datetimeFigureOut">
               <a:rPr lang="en-US" smtClean="0"/>
-              <a:t>4/11/2020</a:t>
+              <a:t>4/17/2020</a:t>
             </a:fld>
             <a:endParaRPr lang="en-US"/>
           </a:p>
@@ -827,7 +830,7 @@
           <a:p>
             <a:fld id="{846CE7D5-CF57-46EF-B807-FDD0502418D4}" type="datetimeFigureOut">
               <a:rPr lang="en-US" smtClean="0"/>
-              <a:t>4/11/2020</a:t>
+              <a:t>4/17/2020</a:t>
             </a:fld>
             <a:endParaRPr lang="en-US"/>
           </a:p>
@@ -1085,7 +1088,7 @@
           <a:p>
             <a:fld id="{846CE7D5-CF57-46EF-B807-FDD0502418D4}" type="datetimeFigureOut">
               <a:rPr lang="en-US" smtClean="0"/>
-              <a:t>4/11/2020</a:t>
+              <a:t>4/17/2020</a:t>
             </a:fld>
             <a:endParaRPr lang="en-US"/>
           </a:p>
@@ -1329,7 +1332,7 @@
           <a:p>
             <a:fld id="{846CE7D5-CF57-46EF-B807-FDD0502418D4}" type="datetimeFigureOut">
               <a:rPr lang="en-US" smtClean="0"/>
-              <a:t>4/11/2020</a:t>
+              <a:t>4/17/2020</a:t>
             </a:fld>
             <a:endParaRPr lang="en-US"/>
           </a:p>
@@ -1708,7 +1711,7 @@
           <a:p>
             <a:fld id="{846CE7D5-CF57-46EF-B807-FDD0502418D4}" type="datetimeFigureOut">
               <a:rPr lang="en-US" smtClean="0"/>
-              <a:t>4/11/2020</a:t>
+              <a:t>4/17/2020</a:t>
             </a:fld>
             <a:endParaRPr lang="en-US"/>
           </a:p>
@@ -1838,7 +1841,7 @@
           <a:p>
             <a:fld id="{846CE7D5-CF57-46EF-B807-FDD0502418D4}" type="datetimeFigureOut">
               <a:rPr lang="en-US" smtClean="0"/>
-              <a:t>4/11/2020</a:t>
+              <a:t>4/17/2020</a:t>
             </a:fld>
             <a:endParaRPr lang="en-US"/>
           </a:p>
@@ -1945,7 +1948,7 @@
           <a:p>
             <a:fld id="{846CE7D5-CF57-46EF-B807-FDD0502418D4}" type="datetimeFigureOut">
               <a:rPr lang="en-US" smtClean="0"/>
-              <a:t>4/11/2020</a:t>
+              <a:t>4/17/2020</a:t>
             </a:fld>
             <a:endParaRPr lang="en-US"/>
           </a:p>
@@ -2234,7 +2237,7 @@
           <a:p>
             <a:fld id="{846CE7D5-CF57-46EF-B807-FDD0502418D4}" type="datetimeFigureOut">
               <a:rPr lang="en-US" smtClean="0"/>
-              <a:t>4/11/2020</a:t>
+              <a:t>4/17/2020</a:t>
             </a:fld>
             <a:endParaRPr lang="en-US"/>
           </a:p>
@@ -2503,7 +2506,7 @@
           <a:p>
             <a:fld id="{846CE7D5-CF57-46EF-B807-FDD0502418D4}" type="datetimeFigureOut">
               <a:rPr lang="en-US" smtClean="0"/>
-              <a:t>4/11/2020</a:t>
+              <a:t>4/17/2020</a:t>
             </a:fld>
             <a:endParaRPr lang="en-US"/>
           </a:p>
@@ -2723,7 +2726,7 @@
           <a:p>
             <a:fld id="{846CE7D5-CF57-46EF-B807-FDD0502418D4}" type="datetimeFigureOut">
               <a:rPr lang="en-US" smtClean="0"/>
-              <a:t>4/11/2020</a:t>
+              <a:t>4/17/2020</a:t>
             </a:fld>
             <a:endParaRPr lang="en-US"/>
           </a:p>
@@ -3264,18 +3267,204 @@
   <p:clrMapOvr>
     <a:masterClrMapping/>
   </p:clrMapOvr>
-  <mc:AlternateContent xmlns:mc="http://schemas.openxmlformats.org/markup-compatibility/2006">
-    <mc:Choice xmlns:p14="http://schemas.microsoft.com/office/powerpoint/2010/main" Requires="p14">
+  <mc:AlternateContent xmlns:mc="http://schemas.openxmlformats.org/markup-compatibility/2006" xmlns:p14="http://schemas.microsoft.com/office/powerpoint/2010/main">
+    <mc:Choice Requires="p14">
       <p:transition spd="med" p14:dur="700">
         <p:fade/>
       </p:transition>
     </mc:Choice>
-    <mc:Fallback>
+    <mc:Fallback xmlns="">
       <p:transition spd="med">
         <p:fade/>
       </p:transition>
     </mc:Fallback>
   </mc:AlternateContent>
+</p:sld>
+</file>
+
+<file path=ppt/slides/slide10.xml><?xml version="1.0" encoding="utf-8"?>
+<p:sld xmlns:a="http://schemas.openxmlformats.org/drawingml/2006/main" xmlns:r="http://schemas.openxmlformats.org/officeDocument/2006/relationships" xmlns:p="http://schemas.openxmlformats.org/presentationml/2006/main">
+  <p:cSld>
+    <p:spTree>
+      <p:nvGrpSpPr>
+        <p:cNvPr id="1" name=""/>
+        <p:cNvGrpSpPr/>
+        <p:nvPr/>
+      </p:nvGrpSpPr>
+      <p:grpSpPr>
+        <a:xfrm>
+          <a:off x="0" y="0"/>
+          <a:ext cx="0" cy="0"/>
+          <a:chOff x="0" y="0"/>
+          <a:chExt cx="0" cy="0"/>
+        </a:xfrm>
+      </p:grpSpPr>
+      <p:sp>
+        <p:nvSpPr>
+          <p:cNvPr id="2" name="Título 1">
+            <a:extLst>
+              <a:ext uri="{FF2B5EF4-FFF2-40B4-BE49-F238E27FC236}">
+                <a16:creationId xmlns:a16="http://schemas.microsoft.com/office/drawing/2014/main" id="{8601B399-0524-4323-8132-A42F54EEC692}"/>
+              </a:ext>
+            </a:extLst>
+          </p:cNvPr>
+          <p:cNvSpPr>
+            <a:spLocks noGrp="1"/>
+          </p:cNvSpPr>
+          <p:nvPr>
+            <p:ph type="title"/>
+          </p:nvPr>
+        </p:nvSpPr>
+        <p:spPr/>
+        <p:txBody>
+          <a:bodyPr/>
+          <a:lstStyle/>
+          <a:p>
+            <a:r>
+              <a:rPr lang="en-US" dirty="0">
+                <a:solidFill>
+                  <a:srgbClr val="61DBFB"/>
+                </a:solidFill>
+                <a:cs typeface="Calibri Light"/>
+              </a:rPr>
+              <a:t>Code examples</a:t>
+            </a:r>
+            <a:endParaRPr lang="pt-PT" dirty="0"/>
+          </a:p>
+        </p:txBody>
+      </p:sp>
+      <p:sp>
+        <p:nvSpPr>
+          <p:cNvPr id="4" name="CaixaDeTexto 3">
+            <a:extLst>
+              <a:ext uri="{FF2B5EF4-FFF2-40B4-BE49-F238E27FC236}">
+                <a16:creationId xmlns:a16="http://schemas.microsoft.com/office/drawing/2014/main" id="{7F89434B-29EB-4B26-B4FD-600BB1791797}"/>
+              </a:ext>
+            </a:extLst>
+          </p:cNvPr>
+          <p:cNvSpPr txBox="1"/>
+          <p:nvPr/>
+        </p:nvSpPr>
+        <p:spPr>
+          <a:xfrm>
+            <a:off x="766029" y="1490518"/>
+            <a:ext cx="418704" cy="646331"/>
+          </a:xfrm>
+          <a:prstGeom prst="rect">
+            <a:avLst/>
+          </a:prstGeom>
+          <a:noFill/>
+        </p:spPr>
+        <p:txBody>
+          <a:bodyPr wrap="none" rtlCol="0">
+            <a:spAutoFit/>
+          </a:bodyPr>
+          <a:lstStyle/>
+          <a:p>
+            <a:r>
+              <a:rPr lang="pt-PT" sz="3600" b="1" dirty="0">
+                <a:solidFill>
+                  <a:schemeClr val="bg1"/>
+                </a:solidFill>
+                <a:effectLst>
+                  <a:outerShdw blurRad="38100" dist="38100" dir="2700000" algn="tl">
+                    <a:srgbClr val="000000">
+                      <a:alpha val="43137"/>
+                    </a:srgbClr>
+                  </a:outerShdw>
+                </a:effectLst>
+                <a:highlight>
+                  <a:srgbClr val="008080"/>
+                </a:highlight>
+              </a:rPr>
+              <a:t>3</a:t>
+            </a:r>
+            <a:endParaRPr lang="pt-PT" b="1" dirty="0">
+              <a:solidFill>
+                <a:schemeClr val="bg1"/>
+              </a:solidFill>
+              <a:effectLst>
+                <a:outerShdw blurRad="38100" dist="38100" dir="2700000" algn="tl">
+                  <a:srgbClr val="000000">
+                    <a:alpha val="43137"/>
+                  </a:srgbClr>
+                </a:outerShdw>
+              </a:effectLst>
+              <a:highlight>
+                <a:srgbClr val="008080"/>
+              </a:highlight>
+            </a:endParaRPr>
+          </a:p>
+        </p:txBody>
+      </p:sp>
+      <p:sp>
+        <p:nvSpPr>
+          <p:cNvPr id="5" name="CaixaDeTexto 4">
+            <a:extLst>
+              <a:ext uri="{FF2B5EF4-FFF2-40B4-BE49-F238E27FC236}">
+                <a16:creationId xmlns:a16="http://schemas.microsoft.com/office/drawing/2014/main" id="{5C0B74A1-CD91-425B-9591-55FB57F402CA}"/>
+              </a:ext>
+            </a:extLst>
+          </p:cNvPr>
+          <p:cNvSpPr txBox="1"/>
+          <p:nvPr/>
+        </p:nvSpPr>
+        <p:spPr>
+          <a:xfrm>
+            <a:off x="1121488" y="1795210"/>
+            <a:ext cx="1269707" cy="400110"/>
+          </a:xfrm>
+          <a:prstGeom prst="rect">
+            <a:avLst/>
+          </a:prstGeom>
+          <a:noFill/>
+        </p:spPr>
+        <p:txBody>
+          <a:bodyPr wrap="none" rtlCol="0">
+            <a:spAutoFit/>
+          </a:bodyPr>
+          <a:lstStyle/>
+          <a:p>
+            <a:r>
+              <a:rPr lang="en-US" sz="2000" b="1" dirty="0">
+                <a:solidFill>
+                  <a:schemeClr val="bg1"/>
+                </a:solidFill>
+                <a:effectLst>
+                  <a:outerShdw blurRad="38100" dist="38100" dir="2700000" algn="tl">
+                    <a:srgbClr val="000000">
+                      <a:alpha val="43137"/>
+                    </a:srgbClr>
+                  </a:outerShdw>
+                </a:effectLst>
+              </a:rPr>
+              <a:t>Tic tac toe</a:t>
+            </a:r>
+            <a:endParaRPr lang="pt-PT" sz="2000" b="1" dirty="0">
+              <a:solidFill>
+                <a:schemeClr val="bg1"/>
+              </a:solidFill>
+              <a:effectLst>
+                <a:outerShdw blurRad="38100" dist="38100" dir="2700000" algn="tl">
+                  <a:srgbClr val="000000">
+                    <a:alpha val="43137"/>
+                  </a:srgbClr>
+                </a:outerShdw>
+              </a:effectLst>
+            </a:endParaRPr>
+          </a:p>
+        </p:txBody>
+      </p:sp>
+    </p:spTree>
+    <p:extLst>
+      <p:ext uri="{BB962C8B-B14F-4D97-AF65-F5344CB8AC3E}">
+        <p14:creationId xmlns:p14="http://schemas.microsoft.com/office/powerpoint/2010/main" val="760761432"/>
+      </p:ext>
+    </p:extLst>
+  </p:cSld>
+  <p:clrMapOvr>
+    <a:masterClrMapping/>
+  </p:clrMapOvr>
 </p:sld>
 </file>
 
@@ -3389,7 +3578,7 @@
         </p:nvSpPr>
         <p:spPr>
           <a:xfrm>
-            <a:off x="846589" y="3478074"/>
+            <a:off x="687198" y="3478074"/>
             <a:ext cx="2861952" cy="523220"/>
           </a:xfrm>
           <a:prstGeom prst="rect">
@@ -3412,6 +3601,16 @@
                 <a:solidFill>
                   <a:srgbClr val="FFFFFF"/>
                 </a:solidFill>
+                <a:effectLst>
+                  <a:outerShdw blurRad="38100" dist="38100" dir="2700000" algn="tl">
+                    <a:srgbClr val="000000">
+                      <a:alpha val="43137"/>
+                    </a:srgbClr>
+                  </a:outerShdw>
+                </a:effectLst>
+                <a:highlight>
+                  <a:srgbClr val="008080"/>
+                </a:highlight>
               </a:rPr>
               <a:t>Declarative view</a:t>
             </a:r>
@@ -3419,6 +3618,16 @@
               <a:solidFill>
                 <a:srgbClr val="FFFFFF"/>
               </a:solidFill>
+              <a:effectLst>
+                <a:outerShdw blurRad="38100" dist="38100" dir="2700000" algn="tl">
+                  <a:srgbClr val="000000">
+                    <a:alpha val="43137"/>
+                  </a:srgbClr>
+                </a:outerShdw>
+              </a:effectLst>
+              <a:highlight>
+                <a:srgbClr val="008080"/>
+              </a:highlight>
             </a:endParaRPr>
           </a:p>
         </p:txBody>
@@ -3484,7 +3693,7 @@
         </p:nvSpPr>
         <p:spPr>
           <a:xfrm>
-            <a:off x="4679248" y="3447316"/>
+            <a:off x="4209465" y="3478074"/>
             <a:ext cx="2743200" cy="523220"/>
           </a:xfrm>
           <a:prstGeom prst="rect">
@@ -3507,6 +3716,16 @@
                 <a:solidFill>
                   <a:srgbClr val="FFFFFF"/>
                 </a:solidFill>
+                <a:effectLst>
+                  <a:outerShdw blurRad="38100" dist="38100" dir="2700000" algn="tl">
+                    <a:srgbClr val="000000">
+                      <a:alpha val="43137"/>
+                    </a:srgbClr>
+                  </a:outerShdw>
+                </a:effectLst>
+                <a:highlight>
+                  <a:srgbClr val="008080"/>
+                </a:highlight>
               </a:rPr>
               <a:t>Components</a:t>
             </a:r>
@@ -3514,6 +3733,16 @@
               <a:solidFill>
                 <a:srgbClr val="FFFFFF"/>
               </a:solidFill>
+              <a:effectLst>
+                <a:outerShdw blurRad="38100" dist="38100" dir="2700000" algn="tl">
+                  <a:srgbClr val="000000">
+                    <a:alpha val="43137"/>
+                  </a:srgbClr>
+                </a:outerShdw>
+              </a:effectLst>
+              <a:highlight>
+                <a:srgbClr val="008080"/>
+              </a:highlight>
               <a:cs typeface="Calibri"/>
             </a:endParaRPr>
           </a:p>
@@ -3580,7 +3809,7 @@
         </p:nvSpPr>
         <p:spPr>
           <a:xfrm>
-            <a:off x="8339571" y="3447117"/>
+            <a:off x="8051764" y="3429000"/>
             <a:ext cx="2743200" cy="523220"/>
           </a:xfrm>
           <a:prstGeom prst="rect">
@@ -3603,6 +3832,16 @@
                 <a:solidFill>
                   <a:srgbClr val="FFFFFF"/>
                 </a:solidFill>
+                <a:effectLst>
+                  <a:outerShdw blurRad="38100" dist="38100" dir="2700000" algn="tl">
+                    <a:srgbClr val="000000">
+                      <a:alpha val="43137"/>
+                    </a:srgbClr>
+                  </a:outerShdw>
+                </a:effectLst>
+                <a:highlight>
+                  <a:srgbClr val="008080"/>
+                </a:highlight>
               </a:rPr>
               <a:t>User Interface</a:t>
             </a:r>
@@ -3610,6 +3849,16 @@
               <a:solidFill>
                 <a:srgbClr val="FFFFFF"/>
               </a:solidFill>
+              <a:effectLst>
+                <a:outerShdw blurRad="38100" dist="38100" dir="2700000" algn="tl">
+                  <a:srgbClr val="000000">
+                    <a:alpha val="43137"/>
+                  </a:srgbClr>
+                </a:outerShdw>
+              </a:effectLst>
+              <a:highlight>
+                <a:srgbClr val="008080"/>
+              </a:highlight>
               <a:cs typeface="Calibri"/>
             </a:endParaRPr>
           </a:p>
@@ -4249,6 +4498,7 @@
           </a:bodyPr>
           <a:lstStyle/>
           <a:p>
+            <a:pPr algn="just"/>
             <a:r>
               <a:rPr lang="en-US" dirty="0">
                 <a:solidFill>
@@ -4550,8 +4800,8 @@
           <a:lstStyle/>
           <a:p>
             <a:pPr marL="285750" indent="-285750" algn="just">
-              <a:buFont typeface="Courier New"/>
-              <a:buChar char="o"/>
+              <a:buFont typeface="Arial" panose="020B0604020202020204" pitchFamily="34" charset="0"/>
+              <a:buChar char="•"/>
             </a:pPr>
             <a:r>
               <a:rPr lang="en-US" dirty="0">
@@ -4933,12 +5183,6 @@
               </a:rPr>
               <a:t>How does React work?</a:t>
             </a:r>
-            <a:endParaRPr lang="en-US">
-              <a:solidFill>
-                <a:srgbClr val="61DBFB"/>
-              </a:solidFill>
-              <a:cs typeface="Calibri Light"/>
-            </a:endParaRPr>
           </a:p>
         </p:txBody>
       </p:sp>
@@ -4960,7 +5204,7 @@
         </p:nvSpPr>
         <p:spPr>
           <a:xfrm>
-            <a:off x="838200" y="1825625"/>
+            <a:off x="838200" y="1574912"/>
             <a:ext cx="2588821" cy="422585"/>
           </a:xfrm>
         </p:spPr>
@@ -5303,7 +5547,7 @@
               </a:rPr>
               <a:t> </a:t>
             </a:r>
-            <a:endParaRPr lang="en-US" sz="1600">
+            <a:endParaRPr lang="en-US" sz="1600" dirty="0">
               <a:solidFill>
                 <a:schemeClr val="accent4">
                   <a:lumMod val="40000"/>
@@ -5374,7 +5618,7 @@
               </a:rPr>
               <a:t>]}</a:t>
             </a:r>
-            <a:endParaRPr lang="en-US" sz="1600">
+            <a:endParaRPr lang="en-US" sz="1600" dirty="0">
               <a:solidFill>
                 <a:srgbClr val="DB4848"/>
               </a:solidFill>
@@ -5393,7 +5637,7 @@
               <a:t>            </a:t>
             </a:r>
             <a:r>
-              <a:rPr lang="en-US" sz="1600" err="1">
+              <a:rPr lang="en-US" sz="1600" dirty="0" err="1">
                 <a:solidFill>
                   <a:srgbClr val="DB4848"/>
                 </a:solidFill>
@@ -5433,7 +5677,7 @@
               <a:t> </a:t>
             </a:r>
             <a:r>
-              <a:rPr lang="en-US" sz="1600" err="1">
+              <a:rPr lang="en-US" sz="1600" dirty="0" err="1">
                 <a:solidFill>
                   <a:srgbClr val="DB4848"/>
                 </a:solidFill>
@@ -5453,7 +5697,7 @@
               <a:t>(</a:t>
             </a:r>
             <a:r>
-              <a:rPr lang="en-US" sz="1600" err="1">
+              <a:rPr lang="en-US" sz="1600" dirty="0" err="1">
                 <a:solidFill>
                   <a:srgbClr val="DB4848"/>
                 </a:solidFill>
@@ -5472,7 +5716,7 @@
               </a:rPr>
               <a:t>)}</a:t>
             </a:r>
-            <a:endParaRPr lang="en-US" sz="1600">
+            <a:endParaRPr lang="en-US" sz="1600" dirty="0">
               <a:solidFill>
                 <a:srgbClr val="DB4848"/>
               </a:solidFill>
@@ -6198,6 +6442,303 @@
           </a:p>
         </p:txBody>
       </p:sp>
+      <p:sp>
+        <p:nvSpPr>
+          <p:cNvPr id="4" name="CaixaDeTexto 3">
+            <a:extLst>
+              <a:ext uri="{FF2B5EF4-FFF2-40B4-BE49-F238E27FC236}">
+                <a16:creationId xmlns:a16="http://schemas.microsoft.com/office/drawing/2014/main" id="{ABA82CD8-DBFD-4894-BF1C-D8DFF32EC4A1}"/>
+              </a:ext>
+            </a:extLst>
+          </p:cNvPr>
+          <p:cNvSpPr txBox="1"/>
+          <p:nvPr/>
+        </p:nvSpPr>
+        <p:spPr>
+          <a:xfrm>
+            <a:off x="4043494" y="6009866"/>
+            <a:ext cx="1032719" cy="461665"/>
+          </a:xfrm>
+          <a:prstGeom prst="rect">
+            <a:avLst/>
+          </a:prstGeom>
+          <a:noFill/>
+        </p:spPr>
+        <p:txBody>
+          <a:bodyPr wrap="none" rtlCol="0">
+            <a:spAutoFit/>
+          </a:bodyPr>
+          <a:lstStyle/>
+          <a:p>
+            <a:r>
+              <a:rPr lang="pt-PT" sz="2400" b="1" noProof="1">
+                <a:solidFill>
+                  <a:schemeClr val="bg1"/>
+                </a:solidFill>
+                <a:effectLst>
+                  <a:outerShdw blurRad="38100" dist="38100" dir="2700000" algn="tl">
+                    <a:srgbClr val="000000">
+                      <a:alpha val="43137"/>
+                    </a:srgbClr>
+                  </a:outerShdw>
+                </a:effectLst>
+              </a:rPr>
+              <a:t>parent</a:t>
+            </a:r>
+            <a:endParaRPr lang="pt-PT" b="1" noProof="1">
+              <a:solidFill>
+                <a:schemeClr val="bg1"/>
+              </a:solidFill>
+              <a:effectLst>
+                <a:outerShdw blurRad="38100" dist="38100" dir="2700000" algn="tl">
+                  <a:srgbClr val="000000">
+                    <a:alpha val="43137"/>
+                  </a:srgbClr>
+                </a:outerShdw>
+              </a:effectLst>
+            </a:endParaRPr>
+          </a:p>
+        </p:txBody>
+      </p:sp>
+      <p:sp>
+        <p:nvSpPr>
+          <p:cNvPr id="13" name="CaixaDeTexto 12">
+            <a:extLst>
+              <a:ext uri="{FF2B5EF4-FFF2-40B4-BE49-F238E27FC236}">
+                <a16:creationId xmlns:a16="http://schemas.microsoft.com/office/drawing/2014/main" id="{ABD713ED-C3D9-47A2-A1C8-0609F2E3357E}"/>
+              </a:ext>
+            </a:extLst>
+          </p:cNvPr>
+          <p:cNvSpPr txBox="1"/>
+          <p:nvPr/>
+        </p:nvSpPr>
+        <p:spPr>
+          <a:xfrm>
+            <a:off x="10865142" y="5548201"/>
+            <a:ext cx="793807" cy="461665"/>
+          </a:xfrm>
+          <a:prstGeom prst="rect">
+            <a:avLst/>
+          </a:prstGeom>
+          <a:noFill/>
+        </p:spPr>
+        <p:txBody>
+          <a:bodyPr wrap="none" rtlCol="0">
+            <a:spAutoFit/>
+          </a:bodyPr>
+          <a:lstStyle/>
+          <a:p>
+            <a:r>
+              <a:rPr lang="pt-PT" sz="2400" b="1" noProof="1">
+                <a:solidFill>
+                  <a:schemeClr val="bg1"/>
+                </a:solidFill>
+                <a:effectLst>
+                  <a:outerShdw blurRad="38100" dist="38100" dir="2700000" algn="tl">
+                    <a:srgbClr val="000000">
+                      <a:alpha val="43137"/>
+                    </a:srgbClr>
+                  </a:outerShdw>
+                </a:effectLst>
+              </a:rPr>
+              <a:t>child</a:t>
+            </a:r>
+            <a:endParaRPr lang="pt-PT" b="1" noProof="1">
+              <a:solidFill>
+                <a:schemeClr val="bg1"/>
+              </a:solidFill>
+              <a:effectLst>
+                <a:outerShdw blurRad="38100" dist="38100" dir="2700000" algn="tl">
+                  <a:srgbClr val="000000">
+                    <a:alpha val="43137"/>
+                  </a:srgbClr>
+                </a:outerShdw>
+              </a:effectLst>
+            </a:endParaRPr>
+          </a:p>
+        </p:txBody>
+      </p:sp>
+      <p:sp>
+        <p:nvSpPr>
+          <p:cNvPr id="5" name="CaixaDeTexto 4">
+            <a:extLst>
+              <a:ext uri="{FF2B5EF4-FFF2-40B4-BE49-F238E27FC236}">
+                <a16:creationId xmlns:a16="http://schemas.microsoft.com/office/drawing/2014/main" id="{7B9E23B3-3540-400F-A0DB-1127FCA77018}"/>
+              </a:ext>
+            </a:extLst>
+          </p:cNvPr>
+          <p:cNvSpPr txBox="1"/>
+          <p:nvPr/>
+        </p:nvSpPr>
+        <p:spPr>
+          <a:xfrm>
+            <a:off x="8891909" y="6439633"/>
+            <a:ext cx="2767040" cy="276999"/>
+          </a:xfrm>
+          <a:prstGeom prst="rect">
+            <a:avLst/>
+          </a:prstGeom>
+          <a:noFill/>
+        </p:spPr>
+        <p:txBody>
+          <a:bodyPr wrap="none" rtlCol="0">
+            <a:spAutoFit/>
+          </a:bodyPr>
+          <a:lstStyle/>
+          <a:p>
+            <a:r>
+              <a:rPr lang="pt-PT" sz="1200" dirty="0" err="1">
+                <a:solidFill>
+                  <a:schemeClr val="bg1">
+                    <a:lumMod val="85000"/>
+                  </a:schemeClr>
+                </a:solidFill>
+                <a:effectLst>
+                  <a:outerShdw blurRad="38100" dist="38100" dir="2700000" algn="tl">
+                    <a:srgbClr val="000000">
+                      <a:alpha val="43137"/>
+                    </a:srgbClr>
+                  </a:outerShdw>
+                </a:effectLst>
+              </a:rPr>
+              <a:t>From</a:t>
+            </a:r>
+            <a:r>
+              <a:rPr lang="pt-PT" sz="1200" dirty="0">
+                <a:solidFill>
+                  <a:schemeClr val="bg1">
+                    <a:lumMod val="85000"/>
+                  </a:schemeClr>
+                </a:solidFill>
+                <a:effectLst>
+                  <a:outerShdw blurRad="38100" dist="38100" dir="2700000" algn="tl">
+                    <a:srgbClr val="000000">
+                      <a:alpha val="43137"/>
+                    </a:srgbClr>
+                  </a:outerShdw>
+                </a:effectLst>
+              </a:rPr>
+              <a:t> </a:t>
+            </a:r>
+            <a:r>
+              <a:rPr lang="pt-PT" sz="1200" dirty="0" err="1">
+                <a:solidFill>
+                  <a:schemeClr val="bg1">
+                    <a:lumMod val="85000"/>
+                  </a:schemeClr>
+                </a:solidFill>
+                <a:effectLst>
+                  <a:outerShdw blurRad="38100" dist="38100" dir="2700000" algn="tl">
+                    <a:srgbClr val="000000">
+                      <a:alpha val="43137"/>
+                    </a:srgbClr>
+                  </a:outerShdw>
+                </a:effectLst>
+              </a:rPr>
+              <a:t>React</a:t>
+            </a:r>
+            <a:r>
+              <a:rPr lang="pt-PT" sz="1200" dirty="0">
+                <a:solidFill>
+                  <a:schemeClr val="bg1">
+                    <a:lumMod val="85000"/>
+                  </a:schemeClr>
+                </a:solidFill>
+                <a:effectLst>
+                  <a:outerShdw blurRad="38100" dist="38100" dir="2700000" algn="tl">
+                    <a:srgbClr val="000000">
+                      <a:alpha val="43137"/>
+                    </a:srgbClr>
+                  </a:outerShdw>
+                </a:effectLst>
+              </a:rPr>
+              <a:t> tutorial </a:t>
+            </a:r>
+            <a:r>
+              <a:rPr lang="en-US" sz="1200" dirty="0">
+                <a:solidFill>
+                  <a:schemeClr val="bg1">
+                    <a:lumMod val="85000"/>
+                  </a:schemeClr>
+                </a:solidFill>
+                <a:effectLst>
+                  <a:outerShdw blurRad="38100" dist="38100" dir="2700000" algn="tl">
+                    <a:srgbClr val="000000">
+                      <a:alpha val="43137"/>
+                    </a:srgbClr>
+                  </a:outerShdw>
+                </a:effectLst>
+              </a:rPr>
+              <a:t>@</a:t>
+            </a:r>
+            <a:r>
+              <a:rPr lang="pt-PT" sz="1200" dirty="0">
+                <a:hlinkClick r:id="rId2"/>
+              </a:rPr>
+              <a:t>https://reactjs.org/</a:t>
+            </a:r>
+            <a:endParaRPr lang="pt-PT" sz="1200" dirty="0"/>
+          </a:p>
+        </p:txBody>
+      </p:sp>
+      <p:sp>
+        <p:nvSpPr>
+          <p:cNvPr id="6" name="CaixaDeTexto 5">
+            <a:extLst>
+              <a:ext uri="{FF2B5EF4-FFF2-40B4-BE49-F238E27FC236}">
+                <a16:creationId xmlns:a16="http://schemas.microsoft.com/office/drawing/2014/main" id="{908DA507-E712-40EC-BCF1-436A9A123DDA}"/>
+              </a:ext>
+            </a:extLst>
+          </p:cNvPr>
+          <p:cNvSpPr txBox="1"/>
+          <p:nvPr/>
+        </p:nvSpPr>
+        <p:spPr>
+          <a:xfrm>
+            <a:off x="1147525" y="2044365"/>
+            <a:ext cx="1284647" cy="369332"/>
+          </a:xfrm>
+          <a:prstGeom prst="rect">
+            <a:avLst/>
+          </a:prstGeom>
+          <a:noFill/>
+        </p:spPr>
+        <p:txBody>
+          <a:bodyPr wrap="none" rtlCol="0">
+            <a:spAutoFit/>
+          </a:bodyPr>
+          <a:lstStyle/>
+          <a:p>
+            <a:r>
+              <a:rPr lang="en-US" b="1" dirty="0">
+                <a:solidFill>
+                  <a:srgbClr val="FFC000"/>
+                </a:solidFill>
+                <a:effectLst>
+                  <a:outerShdw blurRad="38100" dist="38100" dir="2700000" algn="tl">
+                    <a:srgbClr val="000000">
+                      <a:alpha val="43137"/>
+                    </a:srgbClr>
+                  </a:outerShdw>
+                </a:effectLst>
+              </a:rPr>
+              <a:t>- Tic tac toe</a:t>
+            </a:r>
+            <a:endParaRPr lang="pt-PT" b="1" dirty="0">
+              <a:solidFill>
+                <a:srgbClr val="FFC000"/>
+              </a:solidFill>
+              <a:effectLst>
+                <a:outerShdw blurRad="38100" dist="38100" dir="2700000" algn="tl">
+                  <a:srgbClr val="000000">
+                    <a:alpha val="43137"/>
+                  </a:srgbClr>
+                </a:outerShdw>
+              </a:effectLst>
+            </a:endParaRPr>
+          </a:p>
+        </p:txBody>
+      </p:sp>
     </p:spTree>
     <p:extLst>
       <p:ext uri="{BB962C8B-B14F-4D97-AF65-F5344CB8AC3E}">
@@ -6233,10 +6774,10 @@
       </p:grpSpPr>
       <p:sp>
         <p:nvSpPr>
-          <p:cNvPr id="2" name="Title 1">
+          <p:cNvPr id="2" name="Título 1">
             <a:extLst>
               <a:ext uri="{FF2B5EF4-FFF2-40B4-BE49-F238E27FC236}">
-                <a16:creationId xmlns:a16="http://schemas.microsoft.com/office/drawing/2014/main" id="{A70C40B7-4731-4A51-B776-977CD45FB760}"/>
+                <a16:creationId xmlns:a16="http://schemas.microsoft.com/office/drawing/2014/main" id="{1597F9EC-3D7C-4C8E-BE5F-251CC1A83A9F}"/>
               </a:ext>
             </a:extLst>
           </p:cNvPr>
@@ -6259,48 +6800,524 @@
                 </a:solidFill>
                 <a:cs typeface="Calibri Light"/>
               </a:rPr>
-              <a:t>Why React?</a:t>
-            </a:r>
-            <a:endParaRPr lang="en-US">
-              <a:solidFill>
-                <a:srgbClr val="61DBFB"/>
-              </a:solidFill>
-              <a:cs typeface="Calibri Light"/>
-            </a:endParaRPr>
-          </a:p>
-        </p:txBody>
-      </p:sp>
-      <p:sp>
-        <p:nvSpPr>
-          <p:cNvPr id="3" name="Content Placeholder 2">
+              <a:t>How does React work?</a:t>
+            </a:r>
+            <a:endParaRPr lang="pt-PT" dirty="0"/>
+          </a:p>
+        </p:txBody>
+      </p:sp>
+      <p:sp>
+        <p:nvSpPr>
+          <p:cNvPr id="4" name="Content Placeholder 2">
             <a:extLst>
               <a:ext uri="{FF2B5EF4-FFF2-40B4-BE49-F238E27FC236}">
-                <a16:creationId xmlns:a16="http://schemas.microsoft.com/office/drawing/2014/main" id="{CD4145BF-057D-42D3-94FA-40C0AC0C02DD}"/>
+                <a16:creationId xmlns:a16="http://schemas.microsoft.com/office/drawing/2014/main" id="{8EA41560-BC0F-405B-B0C8-5C1F4D9B4582}"/>
               </a:ext>
             </a:extLst>
           </p:cNvPr>
-          <p:cNvSpPr>
-            <a:spLocks noGrp="1"/>
+          <p:cNvSpPr txBox="1">
+            <a:spLocks/>
           </p:cNvSpPr>
-          <p:nvPr>
-            <p:ph idx="1"/>
-          </p:nvPr>
-        </p:nvSpPr>
-        <p:spPr/>
+          <p:nvPr/>
+        </p:nvSpPr>
+        <p:spPr>
+          <a:xfrm>
+            <a:off x="838200" y="1825625"/>
+            <a:ext cx="10515600" cy="4351338"/>
+          </a:xfrm>
+          <a:prstGeom prst="rect">
+            <a:avLst/>
+          </a:prstGeom>
+        </p:spPr>
         <p:txBody>
           <a:bodyPr vert="horz" lIns="91440" tIns="45720" rIns="91440" bIns="45720" rtlCol="0" anchor="t">
             <a:normAutofit/>
           </a:bodyPr>
-          <a:lstStyle/>
-          <a:p>
+          <a:lstStyle>
+            <a:lvl1pPr marL="228600" indent="-228600" algn="l" defTabSz="914400" rtl="0" eaLnBrk="1" latinLnBrk="0" hangingPunct="1">
+              <a:lnSpc>
+                <a:spcPct val="90000"/>
+              </a:lnSpc>
+              <a:spcBef>
+                <a:spcPts val="1000"/>
+              </a:spcBef>
+              <a:buFont typeface="Arial" panose="020B0604020202020204" pitchFamily="34" charset="0"/>
+              <a:buChar char="•"/>
+              <a:defRPr sz="2800" kern="1200">
+                <a:solidFill>
+                  <a:schemeClr val="tx1"/>
+                </a:solidFill>
+                <a:latin typeface="+mn-lt"/>
+                <a:ea typeface="+mn-ea"/>
+                <a:cs typeface="+mn-cs"/>
+              </a:defRPr>
+            </a:lvl1pPr>
+            <a:lvl2pPr marL="685800" indent="-228600" algn="l" defTabSz="914400" rtl="0" eaLnBrk="1" latinLnBrk="0" hangingPunct="1">
+              <a:lnSpc>
+                <a:spcPct val="90000"/>
+              </a:lnSpc>
+              <a:spcBef>
+                <a:spcPts val="500"/>
+              </a:spcBef>
+              <a:buFont typeface="Arial" panose="020B0604020202020204" pitchFamily="34" charset="0"/>
+              <a:buChar char="•"/>
+              <a:defRPr sz="2400" kern="1200">
+                <a:solidFill>
+                  <a:schemeClr val="tx1"/>
+                </a:solidFill>
+                <a:latin typeface="+mn-lt"/>
+                <a:ea typeface="+mn-ea"/>
+                <a:cs typeface="+mn-cs"/>
+              </a:defRPr>
+            </a:lvl2pPr>
+            <a:lvl3pPr marL="1143000" indent="-228600" algn="l" defTabSz="914400" rtl="0" eaLnBrk="1" latinLnBrk="0" hangingPunct="1">
+              <a:lnSpc>
+                <a:spcPct val="90000"/>
+              </a:lnSpc>
+              <a:spcBef>
+                <a:spcPts val="500"/>
+              </a:spcBef>
+              <a:buFont typeface="Arial" panose="020B0604020202020204" pitchFamily="34" charset="0"/>
+              <a:buChar char="•"/>
+              <a:defRPr sz="2000" kern="1200">
+                <a:solidFill>
+                  <a:schemeClr val="tx1"/>
+                </a:solidFill>
+                <a:latin typeface="+mn-lt"/>
+                <a:ea typeface="+mn-ea"/>
+                <a:cs typeface="+mn-cs"/>
+              </a:defRPr>
+            </a:lvl3pPr>
+            <a:lvl4pPr marL="1600200" indent="-228600" algn="l" defTabSz="914400" rtl="0" eaLnBrk="1" latinLnBrk="0" hangingPunct="1">
+              <a:lnSpc>
+                <a:spcPct val="90000"/>
+              </a:lnSpc>
+              <a:spcBef>
+                <a:spcPts val="500"/>
+              </a:spcBef>
+              <a:buFont typeface="Arial" panose="020B0604020202020204" pitchFamily="34" charset="0"/>
+              <a:buChar char="•"/>
+              <a:defRPr sz="1800" kern="1200">
+                <a:solidFill>
+                  <a:schemeClr val="tx1"/>
+                </a:solidFill>
+                <a:latin typeface="+mn-lt"/>
+                <a:ea typeface="+mn-ea"/>
+                <a:cs typeface="+mn-cs"/>
+              </a:defRPr>
+            </a:lvl4pPr>
+            <a:lvl5pPr marL="2057400" indent="-228600" algn="l" defTabSz="914400" rtl="0" eaLnBrk="1" latinLnBrk="0" hangingPunct="1">
+              <a:lnSpc>
+                <a:spcPct val="90000"/>
+              </a:lnSpc>
+              <a:spcBef>
+                <a:spcPts val="500"/>
+              </a:spcBef>
+              <a:buFont typeface="Arial" panose="020B0604020202020204" pitchFamily="34" charset="0"/>
+              <a:buChar char="•"/>
+              <a:defRPr sz="1800" kern="1200">
+                <a:solidFill>
+                  <a:schemeClr val="tx1"/>
+                </a:solidFill>
+                <a:latin typeface="+mn-lt"/>
+                <a:ea typeface="+mn-ea"/>
+                <a:cs typeface="+mn-cs"/>
+              </a:defRPr>
+            </a:lvl5pPr>
+            <a:lvl6pPr marL="2514600" indent="-228600" algn="l" defTabSz="914400" rtl="0" eaLnBrk="1" latinLnBrk="0" hangingPunct="1">
+              <a:lnSpc>
+                <a:spcPct val="90000"/>
+              </a:lnSpc>
+              <a:spcBef>
+                <a:spcPts val="500"/>
+              </a:spcBef>
+              <a:buFont typeface="Arial" panose="020B0604020202020204" pitchFamily="34" charset="0"/>
+              <a:buChar char="•"/>
+              <a:defRPr sz="1800" kern="1200">
+                <a:solidFill>
+                  <a:schemeClr val="tx1"/>
+                </a:solidFill>
+                <a:latin typeface="+mn-lt"/>
+                <a:ea typeface="+mn-ea"/>
+                <a:cs typeface="+mn-cs"/>
+              </a:defRPr>
+            </a:lvl6pPr>
+            <a:lvl7pPr marL="2971800" indent="-228600" algn="l" defTabSz="914400" rtl="0" eaLnBrk="1" latinLnBrk="0" hangingPunct="1">
+              <a:lnSpc>
+                <a:spcPct val="90000"/>
+              </a:lnSpc>
+              <a:spcBef>
+                <a:spcPts val="500"/>
+              </a:spcBef>
+              <a:buFont typeface="Arial" panose="020B0604020202020204" pitchFamily="34" charset="0"/>
+              <a:buChar char="•"/>
+              <a:defRPr sz="1800" kern="1200">
+                <a:solidFill>
+                  <a:schemeClr val="tx1"/>
+                </a:solidFill>
+                <a:latin typeface="+mn-lt"/>
+                <a:ea typeface="+mn-ea"/>
+                <a:cs typeface="+mn-cs"/>
+              </a:defRPr>
+            </a:lvl7pPr>
+            <a:lvl8pPr marL="3429000" indent="-228600" algn="l" defTabSz="914400" rtl="0" eaLnBrk="1" latinLnBrk="0" hangingPunct="1">
+              <a:lnSpc>
+                <a:spcPct val="90000"/>
+              </a:lnSpc>
+              <a:spcBef>
+                <a:spcPts val="500"/>
+              </a:spcBef>
+              <a:buFont typeface="Arial" panose="020B0604020202020204" pitchFamily="34" charset="0"/>
+              <a:buChar char="•"/>
+              <a:defRPr sz="1800" kern="1200">
+                <a:solidFill>
+                  <a:schemeClr val="tx1"/>
+                </a:solidFill>
+                <a:latin typeface="+mn-lt"/>
+                <a:ea typeface="+mn-ea"/>
+                <a:cs typeface="+mn-cs"/>
+              </a:defRPr>
+            </a:lvl8pPr>
+            <a:lvl9pPr marL="3886200" indent="-228600" algn="l" defTabSz="914400" rtl="0" eaLnBrk="1" latinLnBrk="0" hangingPunct="1">
+              <a:lnSpc>
+                <a:spcPct val="90000"/>
+              </a:lnSpc>
+              <a:spcBef>
+                <a:spcPts val="500"/>
+              </a:spcBef>
+              <a:buFont typeface="Arial" panose="020B0604020202020204" pitchFamily="34" charset="0"/>
+              <a:buChar char="•"/>
+              <a:defRPr sz="1800" kern="1200">
+                <a:solidFill>
+                  <a:schemeClr val="tx1"/>
+                </a:solidFill>
+                <a:latin typeface="+mn-lt"/>
+                <a:ea typeface="+mn-ea"/>
+                <a:cs typeface="+mn-cs"/>
+              </a:defRPr>
+            </a:lvl9pPr>
+          </a:lstStyle>
+          <a:p>
+            <a:pPr algn="just"/>
             <a:r>
               <a:rPr lang="en-US" dirty="0">
                 <a:solidFill>
                   <a:schemeClr val="bg1"/>
                 </a:solidFill>
-                <a:cs typeface="Calibri"/>
-              </a:rPr>
-              <a:t>React makes UI updates a much easier and more intuitive job.</a:t>
+              </a:rPr>
+              <a:t>In the interaction that we just saw in the previous slide between Board and Square, we are passing down two props from Board to Square: value and </a:t>
+            </a:r>
+            <a:r>
+              <a:rPr lang="en-US" dirty="0" err="1">
+                <a:solidFill>
+                  <a:schemeClr val="bg1"/>
+                </a:solidFill>
+              </a:rPr>
+              <a:t>onClick</a:t>
+            </a:r>
+            <a:r>
+              <a:rPr lang="en-US" dirty="0">
+                <a:solidFill>
+                  <a:schemeClr val="bg1"/>
+                </a:solidFill>
+              </a:rPr>
+              <a:t>.</a:t>
+            </a:r>
+          </a:p>
+          <a:p>
+            <a:endParaRPr lang="en-US" dirty="0">
+              <a:solidFill>
+                <a:schemeClr val="bg1"/>
+              </a:solidFill>
+            </a:endParaRPr>
+          </a:p>
+          <a:p>
+            <a:endParaRPr lang="en-US" dirty="0">
+              <a:solidFill>
+                <a:schemeClr val="bg1"/>
+              </a:solidFill>
+            </a:endParaRPr>
+          </a:p>
+          <a:p>
+            <a:pPr lvl="1" algn="just"/>
+            <a:r>
+              <a:rPr lang="en-US" u="sng" dirty="0">
+                <a:solidFill>
+                  <a:schemeClr val="accent4">
+                    <a:lumMod val="40000"/>
+                    <a:lumOff val="60000"/>
+                  </a:schemeClr>
+                </a:solidFill>
+                <a:effectLst>
+                  <a:outerShdw blurRad="38100" dist="38100" dir="2700000" algn="tl">
+                    <a:srgbClr val="000000">
+                      <a:alpha val="43137"/>
+                    </a:srgbClr>
+                  </a:outerShdw>
+                </a:effectLst>
+              </a:rPr>
+              <a:t>Board</a:t>
+            </a:r>
+            <a:r>
+              <a:rPr lang="en-US" dirty="0">
+                <a:solidFill>
+                  <a:schemeClr val="bg1"/>
+                </a:solidFill>
+              </a:rPr>
+              <a:t> is keeping an array </a:t>
+            </a:r>
+            <a:r>
+              <a:rPr lang="en-US" i="1" dirty="0">
+                <a:solidFill>
+                  <a:srgbClr val="40A2DB"/>
+                </a:solidFill>
+                <a:effectLst>
+                  <a:outerShdw blurRad="38100" dist="38100" dir="2700000" algn="tl">
+                    <a:srgbClr val="000000">
+                      <a:alpha val="43137"/>
+                    </a:srgbClr>
+                  </a:outerShdw>
+                </a:effectLst>
+              </a:rPr>
+              <a:t>squares</a:t>
+            </a:r>
+            <a:r>
+              <a:rPr lang="en-US" dirty="0">
+                <a:solidFill>
+                  <a:schemeClr val="bg1"/>
+                </a:solidFill>
+              </a:rPr>
+              <a:t> with the information of the data in each square of the tic tac toe game. It also has a function that deals with a click event, </a:t>
+            </a:r>
+            <a:r>
+              <a:rPr lang="en-US" i="1" dirty="0" err="1">
+                <a:solidFill>
+                  <a:srgbClr val="40A2DB"/>
+                </a:solidFill>
+                <a:effectLst>
+                  <a:outerShdw blurRad="38100" dist="38100" dir="2700000" algn="tl">
+                    <a:srgbClr val="000000">
+                      <a:alpha val="43137"/>
+                    </a:srgbClr>
+                  </a:outerShdw>
+                </a:effectLst>
+              </a:rPr>
+              <a:t>handleClick</a:t>
+            </a:r>
+            <a:r>
+              <a:rPr lang="en-US" i="1" dirty="0">
+                <a:solidFill>
+                  <a:srgbClr val="40A2DB"/>
+                </a:solidFill>
+                <a:effectLst>
+                  <a:outerShdw blurRad="38100" dist="38100" dir="2700000" algn="tl">
+                    <a:srgbClr val="000000">
+                      <a:alpha val="43137"/>
+                    </a:srgbClr>
+                  </a:outerShdw>
+                </a:effectLst>
+              </a:rPr>
+              <a:t>()</a:t>
+            </a:r>
+            <a:r>
+              <a:rPr lang="en-US" dirty="0">
+                <a:solidFill>
+                  <a:schemeClr val="bg1"/>
+                </a:solidFill>
+              </a:rPr>
+              <a:t>. </a:t>
+            </a:r>
+            <a:r>
+              <a:rPr lang="en-US" u="sng" dirty="0">
+                <a:solidFill>
+                  <a:schemeClr val="accent4">
+                    <a:lumMod val="40000"/>
+                    <a:lumOff val="60000"/>
+                  </a:schemeClr>
+                </a:solidFill>
+                <a:effectLst>
+                  <a:outerShdw blurRad="38100" dist="38100" dir="2700000" algn="tl">
+                    <a:srgbClr val="000000">
+                      <a:alpha val="43137"/>
+                    </a:srgbClr>
+                  </a:outerShdw>
+                </a:effectLst>
+              </a:rPr>
+              <a:t>Square</a:t>
+            </a:r>
+            <a:r>
+              <a:rPr lang="en-US" dirty="0">
+                <a:solidFill>
+                  <a:schemeClr val="bg1"/>
+                </a:solidFill>
+              </a:rPr>
+              <a:t> uses </a:t>
+            </a:r>
+            <a:r>
+              <a:rPr lang="en-US" i="1" dirty="0" err="1">
+                <a:solidFill>
+                  <a:srgbClr val="40A2DB"/>
+                </a:solidFill>
+                <a:effectLst>
+                  <a:outerShdw blurRad="38100" dist="38100" dir="2700000" algn="tl">
+                    <a:srgbClr val="000000">
+                      <a:alpha val="43137"/>
+                    </a:srgbClr>
+                  </a:outerShdw>
+                </a:effectLst>
+              </a:rPr>
+              <a:t>handleClick</a:t>
+            </a:r>
+            <a:r>
+              <a:rPr lang="en-US" i="1" dirty="0">
+                <a:solidFill>
+                  <a:srgbClr val="40A2DB"/>
+                </a:solidFill>
+                <a:effectLst>
+                  <a:outerShdw blurRad="38100" dist="38100" dir="2700000" algn="tl">
+                    <a:srgbClr val="000000">
+                      <a:alpha val="43137"/>
+                    </a:srgbClr>
+                  </a:outerShdw>
+                </a:effectLst>
+              </a:rPr>
+              <a:t>()</a:t>
+            </a:r>
+            <a:r>
+              <a:rPr lang="en-US" dirty="0">
+                <a:solidFill>
+                  <a:srgbClr val="40A2DB"/>
+                </a:solidFill>
+                <a:effectLst>
+                  <a:outerShdw blurRad="38100" dist="38100" dir="2700000" algn="tl">
+                    <a:srgbClr val="000000">
+                      <a:alpha val="43137"/>
+                    </a:srgbClr>
+                  </a:outerShdw>
+                </a:effectLst>
+              </a:rPr>
+              <a:t> </a:t>
+            </a:r>
+            <a:r>
+              <a:rPr lang="en-US" dirty="0">
+                <a:solidFill>
+                  <a:schemeClr val="bg1"/>
+                </a:solidFill>
+              </a:rPr>
+              <a:t>to fill the clicked position in </a:t>
+            </a:r>
+            <a:r>
+              <a:rPr lang="en-US" i="1" dirty="0">
+                <a:solidFill>
+                  <a:srgbClr val="40A2DB"/>
+                </a:solidFill>
+                <a:effectLst>
+                  <a:outerShdw blurRad="38100" dist="38100" dir="2700000" algn="tl">
+                    <a:srgbClr val="000000">
+                      <a:alpha val="43137"/>
+                    </a:srgbClr>
+                  </a:outerShdw>
+                </a:effectLst>
+              </a:rPr>
+              <a:t>squares</a:t>
+            </a:r>
+            <a:r>
+              <a:rPr lang="en-US" dirty="0">
+                <a:solidFill>
+                  <a:schemeClr val="bg1"/>
+                </a:solidFill>
+              </a:rPr>
+              <a:t>, and then uses </a:t>
+            </a:r>
+            <a:r>
+              <a:rPr lang="en-US" i="1" dirty="0">
+                <a:solidFill>
+                  <a:srgbClr val="40A2DB"/>
+                </a:solidFill>
+                <a:effectLst>
+                  <a:outerShdw blurRad="38100" dist="38100" dir="2700000" algn="tl">
+                    <a:srgbClr val="000000">
+                      <a:alpha val="43137"/>
+                    </a:srgbClr>
+                  </a:outerShdw>
+                </a:effectLst>
+              </a:rPr>
+              <a:t>squares</a:t>
+            </a:r>
+            <a:r>
+              <a:rPr lang="en-US" dirty="0">
+                <a:solidFill>
+                  <a:schemeClr val="bg1"/>
+                </a:solidFill>
+              </a:rPr>
+              <a:t> to get the value that was just filled by the click handler, either ‘X’ or ‘O’, and then writes it in the </a:t>
+            </a:r>
+            <a:r>
+              <a:rPr lang="en-US" dirty="0">
+                <a:solidFill>
+                  <a:srgbClr val="DB4848"/>
+                </a:solidFill>
+              </a:rPr>
+              <a:t>&lt;button&gt;</a:t>
+            </a:r>
+            <a:r>
+              <a:rPr lang="en-US" dirty="0">
+                <a:solidFill>
+                  <a:schemeClr val="bg1"/>
+                </a:solidFill>
+              </a:rPr>
+              <a:t>.</a:t>
+            </a:r>
+            <a:endParaRPr lang="pt-PT" dirty="0">
+              <a:solidFill>
+                <a:srgbClr val="DB4848"/>
+              </a:solidFill>
+            </a:endParaRPr>
+          </a:p>
+        </p:txBody>
+      </p:sp>
+      <p:sp>
+        <p:nvSpPr>
+          <p:cNvPr id="5" name="CaixaDeTexto 4">
+            <a:extLst>
+              <a:ext uri="{FF2B5EF4-FFF2-40B4-BE49-F238E27FC236}">
+                <a16:creationId xmlns:a16="http://schemas.microsoft.com/office/drawing/2014/main" id="{15584DCE-718B-4E4E-B233-14CD8F12C720}"/>
+              </a:ext>
+            </a:extLst>
+          </p:cNvPr>
+          <p:cNvSpPr txBox="1"/>
+          <p:nvPr/>
+        </p:nvSpPr>
+        <p:spPr>
+          <a:xfrm>
+            <a:off x="838200" y="3429000"/>
+            <a:ext cx="10285602" cy="461665"/>
+          </a:xfrm>
+          <a:prstGeom prst="rect">
+            <a:avLst/>
+          </a:prstGeom>
+          <a:noFill/>
+        </p:spPr>
+        <p:txBody>
+          <a:bodyPr wrap="square" rtlCol="0">
+            <a:spAutoFit/>
+          </a:bodyPr>
+          <a:lstStyle/>
+          <a:p>
+            <a:r>
+              <a:rPr lang="pt-PT" sz="2400" noProof="1">
+                <a:solidFill>
+                  <a:srgbClr val="3FBF70"/>
+                </a:solidFill>
+                <a:effectLst>
+                  <a:outerShdw blurRad="38100" dist="38100" dir="2700000" algn="tl">
+                    <a:srgbClr val="000000">
+                      <a:alpha val="43137"/>
+                    </a:srgbClr>
+                  </a:outerShdw>
+                </a:effectLst>
+              </a:rPr>
+              <a:t>	To be more specific…</a:t>
             </a:r>
           </a:p>
         </p:txBody>
@@ -6308,7 +7325,7 @@
     </p:spTree>
     <p:extLst>
       <p:ext uri="{BB962C8B-B14F-4D97-AF65-F5344CB8AC3E}">
-        <p14:creationId xmlns:p14="http://schemas.microsoft.com/office/powerpoint/2010/main" val="1565860309"/>
+        <p14:creationId xmlns:p14="http://schemas.microsoft.com/office/powerpoint/2010/main" val="4022406703"/>
       </p:ext>
     </p:extLst>
   </p:cSld>
@@ -6316,7 +7333,7 @@
     <a:masterClrMapping/>
   </p:clrMapOvr>
   <p:transition spd="slow">
-    <p:push/>
+    <p:push dir="u"/>
   </p:transition>
 </p:sld>
 </file>
@@ -6343,6 +7360,139 @@
           <p:cNvPr id="2" name="Title 1">
             <a:extLst>
               <a:ext uri="{FF2B5EF4-FFF2-40B4-BE49-F238E27FC236}">
+                <a16:creationId xmlns:a16="http://schemas.microsoft.com/office/drawing/2014/main" id="{A70C40B7-4731-4A51-B776-977CD45FB760}"/>
+              </a:ext>
+            </a:extLst>
+          </p:cNvPr>
+          <p:cNvSpPr>
+            <a:spLocks noGrp="1"/>
+          </p:cNvSpPr>
+          <p:nvPr>
+            <p:ph type="title"/>
+          </p:nvPr>
+        </p:nvSpPr>
+        <p:spPr/>
+        <p:txBody>
+          <a:bodyPr/>
+          <a:lstStyle/>
+          <a:p>
+            <a:r>
+              <a:rPr lang="en-US" dirty="0">
+                <a:solidFill>
+                  <a:srgbClr val="61DBFB"/>
+                </a:solidFill>
+                <a:cs typeface="Calibri Light"/>
+              </a:rPr>
+              <a:t>Why React?</a:t>
+            </a:r>
+          </a:p>
+        </p:txBody>
+      </p:sp>
+      <p:sp>
+        <p:nvSpPr>
+          <p:cNvPr id="3" name="Content Placeholder 2">
+            <a:extLst>
+              <a:ext uri="{FF2B5EF4-FFF2-40B4-BE49-F238E27FC236}">
+                <a16:creationId xmlns:a16="http://schemas.microsoft.com/office/drawing/2014/main" id="{CD4145BF-057D-42D3-94FA-40C0AC0C02DD}"/>
+              </a:ext>
+            </a:extLst>
+          </p:cNvPr>
+          <p:cNvSpPr>
+            <a:spLocks noGrp="1"/>
+          </p:cNvSpPr>
+          <p:nvPr>
+            <p:ph idx="1"/>
+          </p:nvPr>
+        </p:nvSpPr>
+        <p:spPr>
+          <a:xfrm>
+            <a:off x="838200" y="1825625"/>
+            <a:ext cx="10515600" cy="2259814"/>
+          </a:xfrm>
+        </p:spPr>
+        <p:txBody>
+          <a:bodyPr vert="horz" lIns="91440" tIns="45720" rIns="91440" bIns="45720" rtlCol="0" anchor="t">
+            <a:normAutofit lnSpcReduction="10000"/>
+          </a:bodyPr>
+          <a:lstStyle/>
+          <a:p>
+            <a:r>
+              <a:rPr lang="en-US" dirty="0">
+                <a:solidFill>
+                  <a:schemeClr val="bg1"/>
+                </a:solidFill>
+                <a:cs typeface="Calibri"/>
+              </a:rPr>
+              <a:t>React makes UI updates a much easier and more intuitive job.</a:t>
+            </a:r>
+          </a:p>
+          <a:p>
+            <a:endParaRPr lang="en-US" dirty="0">
+              <a:solidFill>
+                <a:schemeClr val="bg1"/>
+              </a:solidFill>
+              <a:cs typeface="Calibri"/>
+            </a:endParaRPr>
+          </a:p>
+          <a:p>
+            <a:r>
+              <a:rPr lang="en-US" dirty="0">
+                <a:solidFill>
+                  <a:schemeClr val="bg1"/>
+                </a:solidFill>
+                <a:cs typeface="Calibri"/>
+              </a:rPr>
+              <a:t>There is a very good connection between parent a children components, making it easy to access values within one another through props.</a:t>
+            </a:r>
+          </a:p>
+          <a:p>
+            <a:endParaRPr lang="en-US" dirty="0">
+              <a:solidFill>
+                <a:schemeClr val="bg1"/>
+              </a:solidFill>
+              <a:cs typeface="Calibri"/>
+            </a:endParaRPr>
+          </a:p>
+        </p:txBody>
+      </p:sp>
+    </p:spTree>
+    <p:extLst>
+      <p:ext uri="{BB962C8B-B14F-4D97-AF65-F5344CB8AC3E}">
+        <p14:creationId xmlns:p14="http://schemas.microsoft.com/office/powerpoint/2010/main" val="1565860309"/>
+      </p:ext>
+    </p:extLst>
+  </p:cSld>
+  <p:clrMapOvr>
+    <a:masterClrMapping/>
+  </p:clrMapOvr>
+  <p:transition spd="slow">
+    <p:push/>
+  </p:transition>
+</p:sld>
+</file>
+
+<file path=ppt/slides/slide8.xml><?xml version="1.0" encoding="utf-8"?>
+<p:sld xmlns:a="http://schemas.openxmlformats.org/drawingml/2006/main" xmlns:r="http://schemas.openxmlformats.org/officeDocument/2006/relationships" xmlns:p="http://schemas.openxmlformats.org/presentationml/2006/main">
+  <p:cSld>
+    <p:spTree>
+      <p:nvGrpSpPr>
+        <p:cNvPr id="1" name=""/>
+        <p:cNvGrpSpPr/>
+        <p:nvPr/>
+      </p:nvGrpSpPr>
+      <p:grpSpPr>
+        <a:xfrm>
+          <a:off x="0" y="0"/>
+          <a:ext cx="0" cy="0"/>
+          <a:chOff x="0" y="0"/>
+          <a:chExt cx="0" cy="0"/>
+        </a:xfrm>
+      </p:grpSpPr>
+      <p:sp>
+        <p:nvSpPr>
+          <p:cNvPr id="2" name="Title 1">
+            <a:extLst>
+              <a:ext uri="{FF2B5EF4-FFF2-40B4-BE49-F238E27FC236}">
                 <a16:creationId xmlns:a16="http://schemas.microsoft.com/office/drawing/2014/main" id="{712BBEBA-BC94-4022-A529-082895C94004}"/>
               </a:ext>
             </a:extLst>
@@ -6368,6 +7518,833 @@
               </a:rPr>
               <a:t>Code examples</a:t>
             </a:r>
+          </a:p>
+        </p:txBody>
+      </p:sp>
+      <p:sp>
+        <p:nvSpPr>
+          <p:cNvPr id="4" name="CaixaDeTexto 3">
+            <a:extLst>
+              <a:ext uri="{FF2B5EF4-FFF2-40B4-BE49-F238E27FC236}">
+                <a16:creationId xmlns:a16="http://schemas.microsoft.com/office/drawing/2014/main" id="{F5CEBF9C-5BE0-4BC6-A7C5-D88F2C8419EB}"/>
+              </a:ext>
+            </a:extLst>
+          </p:cNvPr>
+          <p:cNvSpPr txBox="1"/>
+          <p:nvPr/>
+        </p:nvSpPr>
+        <p:spPr>
+          <a:xfrm>
+            <a:off x="766029" y="1490518"/>
+            <a:ext cx="418704" cy="646331"/>
+          </a:xfrm>
+          <a:prstGeom prst="rect">
+            <a:avLst/>
+          </a:prstGeom>
+          <a:noFill/>
+        </p:spPr>
+        <p:txBody>
+          <a:bodyPr wrap="none" rtlCol="0">
+            <a:spAutoFit/>
+          </a:bodyPr>
+          <a:lstStyle/>
+          <a:p>
+            <a:r>
+              <a:rPr lang="pt-PT" sz="3600" b="1" dirty="0">
+                <a:solidFill>
+                  <a:schemeClr val="bg1"/>
+                </a:solidFill>
+                <a:effectLst>
+                  <a:outerShdw blurRad="38100" dist="38100" dir="2700000" algn="tl">
+                    <a:srgbClr val="000000">
+                      <a:alpha val="43137"/>
+                    </a:srgbClr>
+                  </a:outerShdw>
+                </a:effectLst>
+                <a:highlight>
+                  <a:srgbClr val="008080"/>
+                </a:highlight>
+              </a:rPr>
+              <a:t>1</a:t>
+            </a:r>
+            <a:endParaRPr lang="pt-PT" b="1" dirty="0">
+              <a:solidFill>
+                <a:schemeClr val="bg1"/>
+              </a:solidFill>
+              <a:effectLst>
+                <a:outerShdw blurRad="38100" dist="38100" dir="2700000" algn="tl">
+                  <a:srgbClr val="000000">
+                    <a:alpha val="43137"/>
+                  </a:srgbClr>
+                </a:outerShdw>
+              </a:effectLst>
+              <a:highlight>
+                <a:srgbClr val="008080"/>
+              </a:highlight>
+            </a:endParaRPr>
+          </a:p>
+        </p:txBody>
+      </p:sp>
+      <p:pic>
+        <p:nvPicPr>
+          <p:cNvPr id="5" name="Imagem 4">
+            <a:extLst>
+              <a:ext uri="{FF2B5EF4-FFF2-40B4-BE49-F238E27FC236}">
+                <a16:creationId xmlns:a16="http://schemas.microsoft.com/office/drawing/2014/main" id="{FB0156B3-5F1E-4F78-A8AB-5022C0920579}"/>
+              </a:ext>
+            </a:extLst>
+          </p:cNvPr>
+          <p:cNvPicPr>
+            <a:picLocks noChangeAspect="1"/>
+          </p:cNvPicPr>
+          <p:nvPr/>
+        </p:nvPicPr>
+        <p:blipFill>
+          <a:blip r:embed="rId2"/>
+          <a:stretch>
+            <a:fillRect/>
+          </a:stretch>
+        </p:blipFill>
+        <p:spPr>
+          <a:xfrm>
+            <a:off x="4822223" y="297605"/>
+            <a:ext cx="3195045" cy="6195270"/>
+          </a:xfrm>
+          <a:prstGeom prst="rect">
+            <a:avLst/>
+          </a:prstGeom>
+        </p:spPr>
+      </p:pic>
+      <p:pic>
+        <p:nvPicPr>
+          <p:cNvPr id="6" name="Imagem 5">
+            <a:extLst>
+              <a:ext uri="{FF2B5EF4-FFF2-40B4-BE49-F238E27FC236}">
+                <a16:creationId xmlns:a16="http://schemas.microsoft.com/office/drawing/2014/main" id="{518B62F9-330E-4308-83A1-2D73B56F1A73}"/>
+              </a:ext>
+            </a:extLst>
+          </p:cNvPr>
+          <p:cNvPicPr>
+            <a:picLocks noChangeAspect="1"/>
+          </p:cNvPicPr>
+          <p:nvPr/>
+        </p:nvPicPr>
+        <p:blipFill>
+          <a:blip r:embed="rId3"/>
+          <a:stretch>
+            <a:fillRect/>
+          </a:stretch>
+        </p:blipFill>
+        <p:spPr>
+          <a:xfrm>
+            <a:off x="4822223" y="6465043"/>
+            <a:ext cx="3195045" cy="234223"/>
+          </a:xfrm>
+          <a:prstGeom prst="rect">
+            <a:avLst/>
+          </a:prstGeom>
+        </p:spPr>
+      </p:pic>
+      <p:pic>
+        <p:nvPicPr>
+          <p:cNvPr id="8" name="Imagem 7">
+            <a:extLst>
+              <a:ext uri="{FF2B5EF4-FFF2-40B4-BE49-F238E27FC236}">
+                <a16:creationId xmlns:a16="http://schemas.microsoft.com/office/drawing/2014/main" id="{9CDAE90D-D98D-4708-A040-415390B9F47A}"/>
+              </a:ext>
+            </a:extLst>
+          </p:cNvPr>
+          <p:cNvPicPr>
+            <a:picLocks noChangeAspect="1"/>
+          </p:cNvPicPr>
+          <p:nvPr/>
+        </p:nvPicPr>
+        <p:blipFill>
+          <a:blip r:embed="rId4"/>
+          <a:stretch>
+            <a:fillRect/>
+          </a:stretch>
+        </p:blipFill>
+        <p:spPr>
+          <a:xfrm>
+            <a:off x="990621" y="3637128"/>
+            <a:ext cx="2410161" cy="2391109"/>
+          </a:xfrm>
+          <a:prstGeom prst="rect">
+            <a:avLst/>
+          </a:prstGeom>
+        </p:spPr>
+      </p:pic>
+      <p:sp>
+        <p:nvSpPr>
+          <p:cNvPr id="9" name="CaixaDeTexto 8">
+            <a:extLst>
+              <a:ext uri="{FF2B5EF4-FFF2-40B4-BE49-F238E27FC236}">
+                <a16:creationId xmlns:a16="http://schemas.microsoft.com/office/drawing/2014/main" id="{D34D04B5-310D-4E41-9C9C-16E36727DBC3}"/>
+              </a:ext>
+            </a:extLst>
+          </p:cNvPr>
+          <p:cNvSpPr txBox="1"/>
+          <p:nvPr/>
+        </p:nvSpPr>
+        <p:spPr>
+          <a:xfrm>
+            <a:off x="9191323" y="4195869"/>
+            <a:ext cx="2162477" cy="430887"/>
+          </a:xfrm>
+          <a:prstGeom prst="rect">
+            <a:avLst/>
+          </a:prstGeom>
+          <a:noFill/>
+        </p:spPr>
+        <p:txBody>
+          <a:bodyPr wrap="square" rtlCol="0">
+            <a:spAutoFit/>
+          </a:bodyPr>
+          <a:lstStyle/>
+          <a:p>
+            <a:pPr algn="r"/>
+            <a:r>
+              <a:rPr lang="pt-PT" sz="1100" i="1" dirty="0" err="1">
+                <a:solidFill>
+                  <a:schemeClr val="bg1"/>
+                </a:solidFill>
+                <a:highlight>
+                  <a:srgbClr val="008080"/>
+                </a:highlight>
+              </a:rPr>
+              <a:t>Doesn</a:t>
+            </a:r>
+            <a:r>
+              <a:rPr lang="en-US" sz="1100" i="1" dirty="0">
+                <a:solidFill>
+                  <a:schemeClr val="bg1"/>
+                </a:solidFill>
+                <a:highlight>
+                  <a:srgbClr val="008080"/>
+                </a:highlight>
+              </a:rPr>
+              <a:t>’t need to be a class because it is just returning</a:t>
+            </a:r>
+            <a:endParaRPr lang="pt-PT" sz="1100" i="1" dirty="0">
+              <a:solidFill>
+                <a:schemeClr val="bg1"/>
+              </a:solidFill>
+              <a:highlight>
+                <a:srgbClr val="008080"/>
+              </a:highlight>
+            </a:endParaRPr>
+          </a:p>
+        </p:txBody>
+      </p:sp>
+      <p:pic>
+        <p:nvPicPr>
+          <p:cNvPr id="7" name="Imagem 6">
+            <a:extLst>
+              <a:ext uri="{FF2B5EF4-FFF2-40B4-BE49-F238E27FC236}">
+                <a16:creationId xmlns:a16="http://schemas.microsoft.com/office/drawing/2014/main" id="{67E1F8A5-156C-48EA-BC75-A4B988AE3B32}"/>
+              </a:ext>
+            </a:extLst>
+          </p:cNvPr>
+          <p:cNvPicPr>
+            <a:picLocks noChangeAspect="1"/>
+          </p:cNvPicPr>
+          <p:nvPr/>
+        </p:nvPicPr>
+        <p:blipFill>
+          <a:blip r:embed="rId5"/>
+          <a:stretch>
+            <a:fillRect/>
+          </a:stretch>
+        </p:blipFill>
+        <p:spPr>
+          <a:xfrm>
+            <a:off x="9160485" y="2662130"/>
+            <a:ext cx="2162477" cy="1533739"/>
+          </a:xfrm>
+          <a:prstGeom prst="rect">
+            <a:avLst/>
+          </a:prstGeom>
+        </p:spPr>
+      </p:pic>
+      <p:pic>
+        <p:nvPicPr>
+          <p:cNvPr id="10" name="Imagem 9">
+            <a:extLst>
+              <a:ext uri="{FF2B5EF4-FFF2-40B4-BE49-F238E27FC236}">
+                <a16:creationId xmlns:a16="http://schemas.microsoft.com/office/drawing/2014/main" id="{60245864-9B56-4EA2-B5C8-F86F11D98F9F}"/>
+              </a:ext>
+            </a:extLst>
+          </p:cNvPr>
+          <p:cNvPicPr>
+            <a:picLocks noChangeAspect="1"/>
+          </p:cNvPicPr>
+          <p:nvPr/>
+        </p:nvPicPr>
+        <p:blipFill>
+          <a:blip r:embed="rId6"/>
+          <a:stretch>
+            <a:fillRect/>
+          </a:stretch>
+        </p:blipFill>
+        <p:spPr>
+          <a:xfrm>
+            <a:off x="838200" y="2423171"/>
+            <a:ext cx="2715004" cy="724001"/>
+          </a:xfrm>
+          <a:prstGeom prst="rect">
+            <a:avLst/>
+          </a:prstGeom>
+        </p:spPr>
+      </p:pic>
+      <p:sp>
+        <p:nvSpPr>
+          <p:cNvPr id="11" name="Retângulo 10">
+            <a:extLst>
+              <a:ext uri="{FF2B5EF4-FFF2-40B4-BE49-F238E27FC236}">
+                <a16:creationId xmlns:a16="http://schemas.microsoft.com/office/drawing/2014/main" id="{A7FD2E69-9746-47D8-8505-DA898D055E50}"/>
+              </a:ext>
+            </a:extLst>
+          </p:cNvPr>
+          <p:cNvSpPr/>
+          <p:nvPr/>
+        </p:nvSpPr>
+        <p:spPr>
+          <a:xfrm>
+            <a:off x="990621" y="2581275"/>
+            <a:ext cx="588148" cy="145256"/>
+          </a:xfrm>
+          <a:prstGeom prst="rect">
+            <a:avLst/>
+          </a:prstGeom>
+          <a:noFill/>
+          <a:ln w="28575">
+            <a:solidFill>
+              <a:srgbClr val="FFC000"/>
+            </a:solidFill>
+          </a:ln>
+        </p:spPr>
+        <p:style>
+          <a:lnRef idx="2">
+            <a:schemeClr val="accent1">
+              <a:shade val="50000"/>
+            </a:schemeClr>
+          </a:lnRef>
+          <a:fillRef idx="1">
+            <a:schemeClr val="accent1"/>
+          </a:fillRef>
+          <a:effectRef idx="0">
+            <a:schemeClr val="accent1"/>
+          </a:effectRef>
+          <a:fontRef idx="minor">
+            <a:schemeClr val="lt1"/>
+          </a:fontRef>
+        </p:style>
+        <p:txBody>
+          <a:bodyPr rtlCol="0" anchor="ctr"/>
+          <a:lstStyle/>
+          <a:p>
+            <a:pPr algn="ctr"/>
+            <a:endParaRPr lang="pt-PT"/>
+          </a:p>
+        </p:txBody>
+      </p:sp>
+      <p:sp>
+        <p:nvSpPr>
+          <p:cNvPr id="12" name="Retângulo 11">
+            <a:extLst>
+              <a:ext uri="{FF2B5EF4-FFF2-40B4-BE49-F238E27FC236}">
+                <a16:creationId xmlns:a16="http://schemas.microsoft.com/office/drawing/2014/main" id="{6F8CDC04-33C5-4837-A9A3-A5DF21EF031B}"/>
+              </a:ext>
+            </a:extLst>
+          </p:cNvPr>
+          <p:cNvSpPr/>
+          <p:nvPr/>
+        </p:nvSpPr>
+        <p:spPr>
+          <a:xfrm>
+            <a:off x="1645941" y="4455603"/>
+            <a:ext cx="588148" cy="145256"/>
+          </a:xfrm>
+          <a:prstGeom prst="rect">
+            <a:avLst/>
+          </a:prstGeom>
+          <a:noFill/>
+          <a:ln w="28575">
+            <a:solidFill>
+              <a:srgbClr val="FFC000"/>
+            </a:solidFill>
+          </a:ln>
+        </p:spPr>
+        <p:style>
+          <a:lnRef idx="2">
+            <a:schemeClr val="accent1">
+              <a:shade val="50000"/>
+            </a:schemeClr>
+          </a:lnRef>
+          <a:fillRef idx="1">
+            <a:schemeClr val="accent1"/>
+          </a:fillRef>
+          <a:effectRef idx="0">
+            <a:schemeClr val="accent1"/>
+          </a:effectRef>
+          <a:fontRef idx="minor">
+            <a:schemeClr val="lt1"/>
+          </a:fontRef>
+        </p:style>
+        <p:txBody>
+          <a:bodyPr rtlCol="0" anchor="ctr"/>
+          <a:lstStyle/>
+          <a:p>
+            <a:pPr algn="ctr"/>
+            <a:endParaRPr lang="pt-PT"/>
+          </a:p>
+        </p:txBody>
+      </p:sp>
+      <p:sp>
+        <p:nvSpPr>
+          <p:cNvPr id="13" name="Retângulo 12">
+            <a:extLst>
+              <a:ext uri="{FF2B5EF4-FFF2-40B4-BE49-F238E27FC236}">
+                <a16:creationId xmlns:a16="http://schemas.microsoft.com/office/drawing/2014/main" id="{1B026541-F345-45A2-ACC5-053EF5552EC4}"/>
+              </a:ext>
+            </a:extLst>
+          </p:cNvPr>
+          <p:cNvSpPr/>
+          <p:nvPr/>
+        </p:nvSpPr>
+        <p:spPr>
+          <a:xfrm>
+            <a:off x="5097972" y="2669750"/>
+            <a:ext cx="1729548" cy="416349"/>
+          </a:xfrm>
+          <a:prstGeom prst="rect">
+            <a:avLst/>
+          </a:prstGeom>
+          <a:noFill/>
+          <a:ln w="28575">
+            <a:solidFill>
+              <a:srgbClr val="FFC000"/>
+            </a:solidFill>
+          </a:ln>
+        </p:spPr>
+        <p:style>
+          <a:lnRef idx="2">
+            <a:schemeClr val="accent1">
+              <a:shade val="50000"/>
+            </a:schemeClr>
+          </a:lnRef>
+          <a:fillRef idx="1">
+            <a:schemeClr val="accent1"/>
+          </a:fillRef>
+          <a:effectRef idx="0">
+            <a:schemeClr val="accent1"/>
+          </a:effectRef>
+          <a:fontRef idx="minor">
+            <a:schemeClr val="lt1"/>
+          </a:fontRef>
+        </p:style>
+        <p:txBody>
+          <a:bodyPr rtlCol="0" anchor="ctr"/>
+          <a:lstStyle/>
+          <a:p>
+            <a:pPr algn="ctr"/>
+            <a:endParaRPr lang="pt-PT"/>
+          </a:p>
+        </p:txBody>
+      </p:sp>
+      <p:cxnSp>
+        <p:nvCxnSpPr>
+          <p:cNvPr id="26" name="Conexão: Ângulo Reto 25">
+            <a:extLst>
+              <a:ext uri="{FF2B5EF4-FFF2-40B4-BE49-F238E27FC236}">
+                <a16:creationId xmlns:a16="http://schemas.microsoft.com/office/drawing/2014/main" id="{42E50D72-2A63-4BFC-B4FE-29C967D4E751}"/>
+              </a:ext>
+            </a:extLst>
+          </p:cNvPr>
+          <p:cNvCxnSpPr>
+            <a:stCxn id="11" idx="1"/>
+          </p:cNvCxnSpPr>
+          <p:nvPr/>
+        </p:nvCxnSpPr>
+        <p:spPr>
+          <a:xfrm rot="10800000" flipV="1">
+            <a:off x="655321" y="2653902"/>
+            <a:ext cx="335301" cy="1102757"/>
+          </a:xfrm>
+          <a:prstGeom prst="bentConnector2">
+            <a:avLst/>
+          </a:prstGeom>
+          <a:ln w="28575">
+            <a:solidFill>
+              <a:srgbClr val="FFC000"/>
+            </a:solidFill>
+          </a:ln>
+        </p:spPr>
+        <p:style>
+          <a:lnRef idx="1">
+            <a:schemeClr val="accent1"/>
+          </a:lnRef>
+          <a:fillRef idx="0">
+            <a:schemeClr val="accent1"/>
+          </a:fillRef>
+          <a:effectRef idx="0">
+            <a:schemeClr val="accent1"/>
+          </a:effectRef>
+          <a:fontRef idx="minor">
+            <a:schemeClr val="tx1"/>
+          </a:fontRef>
+        </p:style>
+      </p:cxnSp>
+      <p:cxnSp>
+        <p:nvCxnSpPr>
+          <p:cNvPr id="28" name="Conexão reta unidirecional 27">
+            <a:extLst>
+              <a:ext uri="{FF2B5EF4-FFF2-40B4-BE49-F238E27FC236}">
+                <a16:creationId xmlns:a16="http://schemas.microsoft.com/office/drawing/2014/main" id="{535C497C-5D00-4544-8F74-BC09535AE5EC}"/>
+              </a:ext>
+            </a:extLst>
+          </p:cNvPr>
+          <p:cNvCxnSpPr/>
+          <p:nvPr/>
+        </p:nvCxnSpPr>
+        <p:spPr>
+          <a:xfrm>
+            <a:off x="648470" y="3756659"/>
+            <a:ext cx="335300" cy="0"/>
+          </a:xfrm>
+          <a:prstGeom prst="straightConnector1">
+            <a:avLst/>
+          </a:prstGeom>
+          <a:ln w="28575">
+            <a:solidFill>
+              <a:srgbClr val="FFC000"/>
+            </a:solidFill>
+            <a:tailEnd type="triangle"/>
+          </a:ln>
+        </p:spPr>
+        <p:style>
+          <a:lnRef idx="1">
+            <a:schemeClr val="accent1"/>
+          </a:lnRef>
+          <a:fillRef idx="0">
+            <a:schemeClr val="accent1"/>
+          </a:fillRef>
+          <a:effectRef idx="0">
+            <a:schemeClr val="accent1"/>
+          </a:effectRef>
+          <a:fontRef idx="minor">
+            <a:schemeClr val="tx1"/>
+          </a:fontRef>
+        </p:style>
+      </p:cxnSp>
+      <p:sp>
+        <p:nvSpPr>
+          <p:cNvPr id="29" name="CaixaDeTexto 28">
+            <a:extLst>
+              <a:ext uri="{FF2B5EF4-FFF2-40B4-BE49-F238E27FC236}">
+                <a16:creationId xmlns:a16="http://schemas.microsoft.com/office/drawing/2014/main" id="{A334B81D-50A7-4E66-93D6-6E21CA2BA486}"/>
+              </a:ext>
+            </a:extLst>
+          </p:cNvPr>
+          <p:cNvSpPr txBox="1"/>
+          <p:nvPr/>
+        </p:nvSpPr>
+        <p:spPr>
+          <a:xfrm>
+            <a:off x="8891909" y="6439633"/>
+            <a:ext cx="2767040" cy="276999"/>
+          </a:xfrm>
+          <a:prstGeom prst="rect">
+            <a:avLst/>
+          </a:prstGeom>
+          <a:noFill/>
+        </p:spPr>
+        <p:txBody>
+          <a:bodyPr wrap="none" rtlCol="0">
+            <a:spAutoFit/>
+          </a:bodyPr>
+          <a:lstStyle/>
+          <a:p>
+            <a:r>
+              <a:rPr lang="pt-PT" sz="1200" dirty="0" err="1">
+                <a:solidFill>
+                  <a:schemeClr val="bg1">
+                    <a:lumMod val="85000"/>
+                  </a:schemeClr>
+                </a:solidFill>
+                <a:effectLst>
+                  <a:outerShdw blurRad="38100" dist="38100" dir="2700000" algn="tl">
+                    <a:srgbClr val="000000">
+                      <a:alpha val="43137"/>
+                    </a:srgbClr>
+                  </a:outerShdw>
+                </a:effectLst>
+              </a:rPr>
+              <a:t>From</a:t>
+            </a:r>
+            <a:r>
+              <a:rPr lang="pt-PT" sz="1200" dirty="0">
+                <a:solidFill>
+                  <a:schemeClr val="bg1">
+                    <a:lumMod val="85000"/>
+                  </a:schemeClr>
+                </a:solidFill>
+                <a:effectLst>
+                  <a:outerShdw blurRad="38100" dist="38100" dir="2700000" algn="tl">
+                    <a:srgbClr val="000000">
+                      <a:alpha val="43137"/>
+                    </a:srgbClr>
+                  </a:outerShdw>
+                </a:effectLst>
+              </a:rPr>
+              <a:t> </a:t>
+            </a:r>
+            <a:r>
+              <a:rPr lang="pt-PT" sz="1200" dirty="0" err="1">
+                <a:solidFill>
+                  <a:schemeClr val="bg1">
+                    <a:lumMod val="85000"/>
+                  </a:schemeClr>
+                </a:solidFill>
+                <a:effectLst>
+                  <a:outerShdw blurRad="38100" dist="38100" dir="2700000" algn="tl">
+                    <a:srgbClr val="000000">
+                      <a:alpha val="43137"/>
+                    </a:srgbClr>
+                  </a:outerShdw>
+                </a:effectLst>
+              </a:rPr>
+              <a:t>React</a:t>
+            </a:r>
+            <a:r>
+              <a:rPr lang="pt-PT" sz="1200" dirty="0">
+                <a:solidFill>
+                  <a:schemeClr val="bg1">
+                    <a:lumMod val="85000"/>
+                  </a:schemeClr>
+                </a:solidFill>
+                <a:effectLst>
+                  <a:outerShdw blurRad="38100" dist="38100" dir="2700000" algn="tl">
+                    <a:srgbClr val="000000">
+                      <a:alpha val="43137"/>
+                    </a:srgbClr>
+                  </a:outerShdw>
+                </a:effectLst>
+              </a:rPr>
+              <a:t> tutorial </a:t>
+            </a:r>
+            <a:r>
+              <a:rPr lang="en-US" sz="1200" dirty="0">
+                <a:solidFill>
+                  <a:schemeClr val="bg1">
+                    <a:lumMod val="85000"/>
+                  </a:schemeClr>
+                </a:solidFill>
+                <a:effectLst>
+                  <a:outerShdw blurRad="38100" dist="38100" dir="2700000" algn="tl">
+                    <a:srgbClr val="000000">
+                      <a:alpha val="43137"/>
+                    </a:srgbClr>
+                  </a:outerShdw>
+                </a:effectLst>
+              </a:rPr>
+              <a:t>@</a:t>
+            </a:r>
+            <a:r>
+              <a:rPr lang="pt-PT" sz="1200" dirty="0">
+                <a:hlinkClick r:id="rId7"/>
+              </a:rPr>
+              <a:t>https://reactjs.org/</a:t>
+            </a:r>
+            <a:endParaRPr lang="pt-PT" sz="1200" dirty="0"/>
+          </a:p>
+        </p:txBody>
+      </p:sp>
+      <p:cxnSp>
+        <p:nvCxnSpPr>
+          <p:cNvPr id="35" name="Conexão: Ângulo Reto 34">
+            <a:extLst>
+              <a:ext uri="{FF2B5EF4-FFF2-40B4-BE49-F238E27FC236}">
+                <a16:creationId xmlns:a16="http://schemas.microsoft.com/office/drawing/2014/main" id="{0B9514A3-4FA4-45FA-94C4-DD293A6686F0}"/>
+              </a:ext>
+            </a:extLst>
+          </p:cNvPr>
+          <p:cNvCxnSpPr>
+            <a:stCxn id="12" idx="3"/>
+          </p:cNvCxnSpPr>
+          <p:nvPr/>
+        </p:nvCxnSpPr>
+        <p:spPr>
+          <a:xfrm flipV="1">
+            <a:off x="2234089" y="365125"/>
+            <a:ext cx="2340748" cy="4163106"/>
+          </a:xfrm>
+          <a:prstGeom prst="bentConnector2">
+            <a:avLst/>
+          </a:prstGeom>
+          <a:ln w="28575">
+            <a:solidFill>
+              <a:srgbClr val="FFC000"/>
+            </a:solidFill>
+          </a:ln>
+        </p:spPr>
+        <p:style>
+          <a:lnRef idx="1">
+            <a:schemeClr val="accent1"/>
+          </a:lnRef>
+          <a:fillRef idx="0">
+            <a:schemeClr val="accent1"/>
+          </a:fillRef>
+          <a:effectRef idx="0">
+            <a:schemeClr val="accent1"/>
+          </a:effectRef>
+          <a:fontRef idx="minor">
+            <a:schemeClr val="tx1"/>
+          </a:fontRef>
+        </p:style>
+      </p:cxnSp>
+      <p:cxnSp>
+        <p:nvCxnSpPr>
+          <p:cNvPr id="37" name="Conexão reta unidirecional 36">
+            <a:extLst>
+              <a:ext uri="{FF2B5EF4-FFF2-40B4-BE49-F238E27FC236}">
+                <a16:creationId xmlns:a16="http://schemas.microsoft.com/office/drawing/2014/main" id="{BCC01648-03FD-4012-9CB6-0CE67D262407}"/>
+              </a:ext>
+            </a:extLst>
+          </p:cNvPr>
+          <p:cNvCxnSpPr/>
+          <p:nvPr/>
+        </p:nvCxnSpPr>
+        <p:spPr>
+          <a:xfrm>
+            <a:off x="4566448" y="365125"/>
+            <a:ext cx="247386" cy="0"/>
+          </a:xfrm>
+          <a:prstGeom prst="straightConnector1">
+            <a:avLst/>
+          </a:prstGeom>
+          <a:ln w="28575">
+            <a:solidFill>
+              <a:srgbClr val="FFC000"/>
+            </a:solidFill>
+            <a:tailEnd type="triangle"/>
+          </a:ln>
+        </p:spPr>
+        <p:style>
+          <a:lnRef idx="1">
+            <a:schemeClr val="accent1"/>
+          </a:lnRef>
+          <a:fillRef idx="0">
+            <a:schemeClr val="accent1"/>
+          </a:fillRef>
+          <a:effectRef idx="0">
+            <a:schemeClr val="accent1"/>
+          </a:effectRef>
+          <a:fontRef idx="minor">
+            <a:schemeClr val="tx1"/>
+          </a:fontRef>
+        </p:style>
+      </p:cxnSp>
+      <p:cxnSp>
+        <p:nvCxnSpPr>
+          <p:cNvPr id="39" name="Conexão: Ângulo Reto 38">
+            <a:extLst>
+              <a:ext uri="{FF2B5EF4-FFF2-40B4-BE49-F238E27FC236}">
+                <a16:creationId xmlns:a16="http://schemas.microsoft.com/office/drawing/2014/main" id="{2C2A4546-60E7-46AA-B8EC-1427ACF1F5EF}"/>
+              </a:ext>
+            </a:extLst>
+          </p:cNvPr>
+          <p:cNvCxnSpPr>
+            <a:stCxn id="13" idx="3"/>
+          </p:cNvCxnSpPr>
+          <p:nvPr/>
+        </p:nvCxnSpPr>
+        <p:spPr>
+          <a:xfrm flipV="1">
+            <a:off x="6827520" y="2726531"/>
+            <a:ext cx="2332965" cy="151394"/>
+          </a:xfrm>
+          <a:prstGeom prst="bentConnector3">
+            <a:avLst/>
+          </a:prstGeom>
+          <a:ln w="28575">
+            <a:solidFill>
+              <a:srgbClr val="FFC000"/>
+            </a:solidFill>
+            <a:tailEnd type="triangle"/>
+          </a:ln>
+        </p:spPr>
+        <p:style>
+          <a:lnRef idx="1">
+            <a:schemeClr val="accent1"/>
+          </a:lnRef>
+          <a:fillRef idx="0">
+            <a:schemeClr val="accent1"/>
+          </a:fillRef>
+          <a:effectRef idx="0">
+            <a:schemeClr val="accent1"/>
+          </a:effectRef>
+          <a:fontRef idx="minor">
+            <a:schemeClr val="tx1"/>
+          </a:fontRef>
+        </p:style>
+      </p:cxnSp>
+      <p:sp>
+        <p:nvSpPr>
+          <p:cNvPr id="40" name="CaixaDeTexto 39">
+            <a:extLst>
+              <a:ext uri="{FF2B5EF4-FFF2-40B4-BE49-F238E27FC236}">
+                <a16:creationId xmlns:a16="http://schemas.microsoft.com/office/drawing/2014/main" id="{A3638077-DE35-4FB8-84DF-A01C51CC4FA5}"/>
+              </a:ext>
+            </a:extLst>
+          </p:cNvPr>
+          <p:cNvSpPr txBox="1"/>
+          <p:nvPr/>
+        </p:nvSpPr>
+        <p:spPr>
+          <a:xfrm>
+            <a:off x="1121488" y="1795210"/>
+            <a:ext cx="1269707" cy="400110"/>
+          </a:xfrm>
+          <a:prstGeom prst="rect">
+            <a:avLst/>
+          </a:prstGeom>
+          <a:noFill/>
+        </p:spPr>
+        <p:txBody>
+          <a:bodyPr wrap="none" rtlCol="0">
+            <a:spAutoFit/>
+          </a:bodyPr>
+          <a:lstStyle/>
+          <a:p>
+            <a:r>
+              <a:rPr lang="en-US" sz="2000" b="1" dirty="0">
+                <a:solidFill>
+                  <a:schemeClr val="bg1"/>
+                </a:solidFill>
+                <a:effectLst>
+                  <a:outerShdw blurRad="38100" dist="38100" dir="2700000" algn="tl">
+                    <a:srgbClr val="000000">
+                      <a:alpha val="43137"/>
+                    </a:srgbClr>
+                  </a:outerShdw>
+                </a:effectLst>
+              </a:rPr>
+              <a:t>Tic tac toe</a:t>
+            </a:r>
+            <a:endParaRPr lang="pt-PT" sz="2000" b="1" dirty="0">
+              <a:solidFill>
+                <a:schemeClr val="bg1"/>
+              </a:solidFill>
+              <a:effectLst>
+                <a:outerShdw blurRad="38100" dist="38100" dir="2700000" algn="tl">
+                  <a:srgbClr val="000000">
+                    <a:alpha val="43137"/>
+                  </a:srgbClr>
+                </a:outerShdw>
+              </a:effectLst>
+            </a:endParaRPr>
           </a:p>
         </p:txBody>
       </p:sp>
@@ -6384,6 +8361,192 @@
   <p:transition spd="slow">
     <p:push/>
   </p:transition>
+</p:sld>
+</file>
+
+<file path=ppt/slides/slide9.xml><?xml version="1.0" encoding="utf-8"?>
+<p:sld xmlns:a="http://schemas.openxmlformats.org/drawingml/2006/main" xmlns:r="http://schemas.openxmlformats.org/officeDocument/2006/relationships" xmlns:p="http://schemas.openxmlformats.org/presentationml/2006/main">
+  <p:cSld>
+    <p:spTree>
+      <p:nvGrpSpPr>
+        <p:cNvPr id="1" name=""/>
+        <p:cNvGrpSpPr/>
+        <p:nvPr/>
+      </p:nvGrpSpPr>
+      <p:grpSpPr>
+        <a:xfrm>
+          <a:off x="0" y="0"/>
+          <a:ext cx="0" cy="0"/>
+          <a:chOff x="0" y="0"/>
+          <a:chExt cx="0" cy="0"/>
+        </a:xfrm>
+      </p:grpSpPr>
+      <p:sp>
+        <p:nvSpPr>
+          <p:cNvPr id="2" name="Título 1">
+            <a:extLst>
+              <a:ext uri="{FF2B5EF4-FFF2-40B4-BE49-F238E27FC236}">
+                <a16:creationId xmlns:a16="http://schemas.microsoft.com/office/drawing/2014/main" id="{EE9E4848-E60C-4ED9-9FE9-040DD00B78E2}"/>
+              </a:ext>
+            </a:extLst>
+          </p:cNvPr>
+          <p:cNvSpPr>
+            <a:spLocks noGrp="1"/>
+          </p:cNvSpPr>
+          <p:nvPr>
+            <p:ph type="title"/>
+          </p:nvPr>
+        </p:nvSpPr>
+        <p:spPr/>
+        <p:txBody>
+          <a:bodyPr/>
+          <a:lstStyle/>
+          <a:p>
+            <a:r>
+              <a:rPr lang="en-US" dirty="0">
+                <a:solidFill>
+                  <a:srgbClr val="61DBFB"/>
+                </a:solidFill>
+                <a:cs typeface="Calibri Light"/>
+              </a:rPr>
+              <a:t>Code examples</a:t>
+            </a:r>
+            <a:endParaRPr lang="pt-PT" dirty="0"/>
+          </a:p>
+        </p:txBody>
+      </p:sp>
+      <p:sp>
+        <p:nvSpPr>
+          <p:cNvPr id="4" name="CaixaDeTexto 3">
+            <a:extLst>
+              <a:ext uri="{FF2B5EF4-FFF2-40B4-BE49-F238E27FC236}">
+                <a16:creationId xmlns:a16="http://schemas.microsoft.com/office/drawing/2014/main" id="{1A14E176-5312-4B64-A6E5-B324D0F4C198}"/>
+              </a:ext>
+            </a:extLst>
+          </p:cNvPr>
+          <p:cNvSpPr txBox="1"/>
+          <p:nvPr/>
+        </p:nvSpPr>
+        <p:spPr>
+          <a:xfrm>
+            <a:off x="766029" y="1490518"/>
+            <a:ext cx="418704" cy="646331"/>
+          </a:xfrm>
+          <a:prstGeom prst="rect">
+            <a:avLst/>
+          </a:prstGeom>
+          <a:noFill/>
+        </p:spPr>
+        <p:txBody>
+          <a:bodyPr wrap="none" rtlCol="0">
+            <a:spAutoFit/>
+          </a:bodyPr>
+          <a:lstStyle/>
+          <a:p>
+            <a:r>
+              <a:rPr lang="pt-PT" sz="3600" b="1" dirty="0">
+                <a:solidFill>
+                  <a:schemeClr val="bg1"/>
+                </a:solidFill>
+                <a:effectLst>
+                  <a:outerShdw blurRad="38100" dist="38100" dir="2700000" algn="tl">
+                    <a:srgbClr val="000000">
+                      <a:alpha val="43137"/>
+                    </a:srgbClr>
+                  </a:outerShdw>
+                </a:effectLst>
+                <a:highlight>
+                  <a:srgbClr val="008080"/>
+                </a:highlight>
+              </a:rPr>
+              <a:t>2</a:t>
+            </a:r>
+            <a:endParaRPr lang="pt-PT" b="1" dirty="0">
+              <a:solidFill>
+                <a:schemeClr val="bg1"/>
+              </a:solidFill>
+              <a:effectLst>
+                <a:outerShdw blurRad="38100" dist="38100" dir="2700000" algn="tl">
+                  <a:srgbClr val="000000">
+                    <a:alpha val="43137"/>
+                  </a:srgbClr>
+                </a:outerShdw>
+              </a:effectLst>
+              <a:highlight>
+                <a:srgbClr val="008080"/>
+              </a:highlight>
+            </a:endParaRPr>
+          </a:p>
+        </p:txBody>
+      </p:sp>
+      <p:sp>
+        <p:nvSpPr>
+          <p:cNvPr id="5" name="CaixaDeTexto 4">
+            <a:extLst>
+              <a:ext uri="{FF2B5EF4-FFF2-40B4-BE49-F238E27FC236}">
+                <a16:creationId xmlns:a16="http://schemas.microsoft.com/office/drawing/2014/main" id="{7431F35D-7438-4FD4-8CE3-59485A38A577}"/>
+              </a:ext>
+            </a:extLst>
+          </p:cNvPr>
+          <p:cNvSpPr txBox="1"/>
+          <p:nvPr/>
+        </p:nvSpPr>
+        <p:spPr>
+          <a:xfrm>
+            <a:off x="1121488" y="1795210"/>
+            <a:ext cx="1269707" cy="400110"/>
+          </a:xfrm>
+          <a:prstGeom prst="rect">
+            <a:avLst/>
+          </a:prstGeom>
+          <a:noFill/>
+        </p:spPr>
+        <p:txBody>
+          <a:bodyPr wrap="none" rtlCol="0">
+            <a:spAutoFit/>
+          </a:bodyPr>
+          <a:lstStyle/>
+          <a:p>
+            <a:r>
+              <a:rPr lang="en-US" sz="2000" b="1" dirty="0">
+                <a:solidFill>
+                  <a:schemeClr val="bg1"/>
+                </a:solidFill>
+                <a:effectLst>
+                  <a:outerShdw blurRad="38100" dist="38100" dir="2700000" algn="tl">
+                    <a:srgbClr val="000000">
+                      <a:alpha val="43137"/>
+                    </a:srgbClr>
+                  </a:outerShdw>
+                </a:effectLst>
+              </a:rPr>
+              <a:t>Tic tac toe</a:t>
+            </a:r>
+            <a:endParaRPr lang="pt-PT" sz="2000" b="1" dirty="0">
+              <a:solidFill>
+                <a:schemeClr val="bg1"/>
+              </a:solidFill>
+              <a:effectLst>
+                <a:outerShdw blurRad="38100" dist="38100" dir="2700000" algn="tl">
+                  <a:srgbClr val="000000">
+                    <a:alpha val="43137"/>
+                  </a:srgbClr>
+                </a:outerShdw>
+              </a:effectLst>
+            </a:endParaRPr>
+          </a:p>
+        </p:txBody>
+      </p:sp>
+    </p:spTree>
+    <p:extLst>
+      <p:ext uri="{BB962C8B-B14F-4D97-AF65-F5344CB8AC3E}">
+        <p14:creationId xmlns:p14="http://schemas.microsoft.com/office/powerpoint/2010/main" val="3254461497"/>
+      </p:ext>
+    </p:extLst>
+  </p:cSld>
+  <p:clrMapOvr>
+    <a:masterClrMapping/>
+  </p:clrMapOvr>
 </p:sld>
 </file>
 

</xml_diff>

<commit_message>
updated ppt presentation with code2
</commit_message>
<xml_diff>
--- a/project-2/Pirple - Project 2.pptx
+++ b/project-2/Pirple - Project 2.pptx
@@ -13,8 +13,9 @@
     <p:sldId id="263" r:id="rId7"/>
     <p:sldId id="259" r:id="rId8"/>
     <p:sldId id="262" r:id="rId9"/>
-    <p:sldId id="264" r:id="rId10"/>
-    <p:sldId id="265" r:id="rId11"/>
+    <p:sldId id="267" r:id="rId10"/>
+    <p:sldId id="264" r:id="rId11"/>
+    <p:sldId id="266" r:id="rId12"/>
   </p:sldIdLst>
   <p:sldSz cx="12192000" cy="6858000"/>
   <p:notesSz cx="6858000" cy="9144000"/>
@@ -274,7 +275,7 @@
           <a:p>
             <a:fld id="{846CE7D5-CF57-46EF-B807-FDD0502418D4}" type="datetimeFigureOut">
               <a:rPr lang="en-US" smtClean="0"/>
-              <a:t>4/17/2020</a:t>
+              <a:t>4/18/2020</a:t>
             </a:fld>
             <a:endParaRPr lang="en-US"/>
           </a:p>
@@ -456,7 +457,7 @@
           <a:p>
             <a:fld id="{846CE7D5-CF57-46EF-B807-FDD0502418D4}" type="datetimeFigureOut">
               <a:rPr lang="en-US" smtClean="0"/>
-              <a:t>4/17/2020</a:t>
+              <a:t>4/18/2020</a:t>
             </a:fld>
             <a:endParaRPr lang="en-US"/>
           </a:p>
@@ -648,7 +649,7 @@
           <a:p>
             <a:fld id="{846CE7D5-CF57-46EF-B807-FDD0502418D4}" type="datetimeFigureOut">
               <a:rPr lang="en-US" smtClean="0"/>
-              <a:t>4/17/2020</a:t>
+              <a:t>4/18/2020</a:t>
             </a:fld>
             <a:endParaRPr lang="en-US"/>
           </a:p>
@@ -830,7 +831,7 @@
           <a:p>
             <a:fld id="{846CE7D5-CF57-46EF-B807-FDD0502418D4}" type="datetimeFigureOut">
               <a:rPr lang="en-US" smtClean="0"/>
-              <a:t>4/17/2020</a:t>
+              <a:t>4/18/2020</a:t>
             </a:fld>
             <a:endParaRPr lang="en-US"/>
           </a:p>
@@ -1088,7 +1089,7 @@
           <a:p>
             <a:fld id="{846CE7D5-CF57-46EF-B807-FDD0502418D4}" type="datetimeFigureOut">
               <a:rPr lang="en-US" smtClean="0"/>
-              <a:t>4/17/2020</a:t>
+              <a:t>4/18/2020</a:t>
             </a:fld>
             <a:endParaRPr lang="en-US"/>
           </a:p>
@@ -1332,7 +1333,7 @@
           <a:p>
             <a:fld id="{846CE7D5-CF57-46EF-B807-FDD0502418D4}" type="datetimeFigureOut">
               <a:rPr lang="en-US" smtClean="0"/>
-              <a:t>4/17/2020</a:t>
+              <a:t>4/18/2020</a:t>
             </a:fld>
             <a:endParaRPr lang="en-US"/>
           </a:p>
@@ -1711,7 +1712,7 @@
           <a:p>
             <a:fld id="{846CE7D5-CF57-46EF-B807-FDD0502418D4}" type="datetimeFigureOut">
               <a:rPr lang="en-US" smtClean="0"/>
-              <a:t>4/17/2020</a:t>
+              <a:t>4/18/2020</a:t>
             </a:fld>
             <a:endParaRPr lang="en-US"/>
           </a:p>
@@ -1841,7 +1842,7 @@
           <a:p>
             <a:fld id="{846CE7D5-CF57-46EF-B807-FDD0502418D4}" type="datetimeFigureOut">
               <a:rPr lang="en-US" smtClean="0"/>
-              <a:t>4/17/2020</a:t>
+              <a:t>4/18/2020</a:t>
             </a:fld>
             <a:endParaRPr lang="en-US"/>
           </a:p>
@@ -1948,7 +1949,7 @@
           <a:p>
             <a:fld id="{846CE7D5-CF57-46EF-B807-FDD0502418D4}" type="datetimeFigureOut">
               <a:rPr lang="en-US" smtClean="0"/>
-              <a:t>4/17/2020</a:t>
+              <a:t>4/18/2020</a:t>
             </a:fld>
             <a:endParaRPr lang="en-US"/>
           </a:p>
@@ -2237,7 +2238,7 @@
           <a:p>
             <a:fld id="{846CE7D5-CF57-46EF-B807-FDD0502418D4}" type="datetimeFigureOut">
               <a:rPr lang="en-US" smtClean="0"/>
-              <a:t>4/17/2020</a:t>
+              <a:t>4/18/2020</a:t>
             </a:fld>
             <a:endParaRPr lang="en-US"/>
           </a:p>
@@ -2506,7 +2507,7 @@
           <a:p>
             <a:fld id="{846CE7D5-CF57-46EF-B807-FDD0502418D4}" type="datetimeFigureOut">
               <a:rPr lang="en-US" smtClean="0"/>
-              <a:t>4/17/2020</a:t>
+              <a:t>4/18/2020</a:t>
             </a:fld>
             <a:endParaRPr lang="en-US"/>
           </a:p>
@@ -2726,7 +2727,7 @@
           <a:p>
             <a:fld id="{846CE7D5-CF57-46EF-B807-FDD0502418D4}" type="datetimeFigureOut">
               <a:rPr lang="en-US" smtClean="0"/>
-              <a:t>4/17/2020</a:t>
+              <a:t>4/18/2020</a:t>
             </a:fld>
             <a:endParaRPr lang="en-US"/>
           </a:p>
@@ -3301,10 +3302,10 @@
       </p:grpSpPr>
       <p:sp>
         <p:nvSpPr>
-          <p:cNvPr id="2" name="Título 1">
+          <p:cNvPr id="2" name="Title 1">
             <a:extLst>
               <a:ext uri="{FF2B5EF4-FFF2-40B4-BE49-F238E27FC236}">
-                <a16:creationId xmlns:a16="http://schemas.microsoft.com/office/drawing/2014/main" id="{8601B399-0524-4323-8132-A42F54EEC692}"/>
+                <a16:creationId xmlns:a16="http://schemas.microsoft.com/office/drawing/2014/main" id="{712BBEBA-BC94-4022-A529-082895C94004}"/>
               </a:ext>
             </a:extLst>
           </p:cNvPr>
@@ -3329,7 +3330,6 @@
               </a:rPr>
               <a:t>Code examples</a:t>
             </a:r>
-            <a:endParaRPr lang="pt-PT" dirty="0"/>
           </a:p>
         </p:txBody>
       </p:sp>
@@ -3338,7 +3338,7 @@
           <p:cNvPr id="4" name="CaixaDeTexto 3">
             <a:extLst>
               <a:ext uri="{FF2B5EF4-FFF2-40B4-BE49-F238E27FC236}">
-                <a16:creationId xmlns:a16="http://schemas.microsoft.com/office/drawing/2014/main" id="{7F89434B-29EB-4B26-B4FD-600BB1791797}"/>
+                <a16:creationId xmlns:a16="http://schemas.microsoft.com/office/drawing/2014/main" id="{F5CEBF9C-5BE0-4BC6-A7C5-D88F2C8419EB}"/>
               </a:ext>
             </a:extLst>
           </p:cNvPr>
@@ -3377,7 +3377,7 @@
                   <a:srgbClr val="008080"/>
                 </a:highlight>
               </a:rPr>
-              <a:t>3</a:t>
+              <a:t>2</a:t>
             </a:r>
             <a:endParaRPr lang="pt-PT" b="1" dirty="0">
               <a:solidFill>
@@ -3399,10 +3399,10 @@
       </p:sp>
       <p:sp>
         <p:nvSpPr>
-          <p:cNvPr id="5" name="CaixaDeTexto 4">
+          <p:cNvPr id="40" name="CaixaDeTexto 39">
             <a:extLst>
               <a:ext uri="{FF2B5EF4-FFF2-40B4-BE49-F238E27FC236}">
-                <a16:creationId xmlns:a16="http://schemas.microsoft.com/office/drawing/2014/main" id="{5C0B74A1-CD91-425B-9591-55FB57F402CA}"/>
+                <a16:creationId xmlns:a16="http://schemas.microsoft.com/office/drawing/2014/main" id="{A3638077-DE35-4FB8-84DF-A01C51CC4FA5}"/>
               </a:ext>
             </a:extLst>
           </p:cNvPr>
@@ -3411,8 +3411,8 @@
         </p:nvSpPr>
         <p:spPr>
           <a:xfrm>
-            <a:off x="1121488" y="1795210"/>
-            <a:ext cx="1269707" cy="400110"/>
+            <a:off x="1256904" y="1613628"/>
+            <a:ext cx="1183209" cy="400110"/>
           </a:xfrm>
           <a:prstGeom prst="rect">
             <a:avLst/>
@@ -3438,7 +3438,7 @@
                   </a:outerShdw>
                 </a:effectLst>
               </a:rPr>
-              <a:t>Tic tac toe</a:t>
+              <a:t>TODO list</a:t>
             </a:r>
             <a:endParaRPr lang="pt-PT" sz="2000" b="1" dirty="0">
               <a:solidFill>
@@ -3455,16 +3455,787 @@
           </a:p>
         </p:txBody>
       </p:sp>
+      <p:pic>
+        <p:nvPicPr>
+          <p:cNvPr id="3" name="Imagem 2">
+            <a:extLst>
+              <a:ext uri="{FF2B5EF4-FFF2-40B4-BE49-F238E27FC236}">
+                <a16:creationId xmlns:a16="http://schemas.microsoft.com/office/drawing/2014/main" id="{6EBBB1F1-8EFD-43D6-B24D-08CA1CF0E845}"/>
+              </a:ext>
+            </a:extLst>
+          </p:cNvPr>
+          <p:cNvPicPr>
+            <a:picLocks noChangeAspect="1"/>
+          </p:cNvPicPr>
+          <p:nvPr/>
+        </p:nvPicPr>
+        <p:blipFill>
+          <a:blip r:embed="rId2"/>
+          <a:stretch>
+            <a:fillRect/>
+          </a:stretch>
+        </p:blipFill>
+        <p:spPr>
+          <a:xfrm>
+            <a:off x="838200" y="2444554"/>
+            <a:ext cx="2953162" cy="743054"/>
+          </a:xfrm>
+          <a:prstGeom prst="rect">
+            <a:avLst/>
+          </a:prstGeom>
+        </p:spPr>
+      </p:pic>
+      <p:pic>
+        <p:nvPicPr>
+          <p:cNvPr id="14" name="Imagem 13">
+            <a:extLst>
+              <a:ext uri="{FF2B5EF4-FFF2-40B4-BE49-F238E27FC236}">
+                <a16:creationId xmlns:a16="http://schemas.microsoft.com/office/drawing/2014/main" id="{F0C119FE-4073-4B68-8F6F-AF356D7BABE4}"/>
+              </a:ext>
+            </a:extLst>
+          </p:cNvPr>
+          <p:cNvPicPr>
+            <a:picLocks noChangeAspect="1"/>
+          </p:cNvPicPr>
+          <p:nvPr/>
+        </p:nvPicPr>
+        <p:blipFill>
+          <a:blip r:embed="rId3"/>
+          <a:stretch>
+            <a:fillRect/>
+          </a:stretch>
+        </p:blipFill>
+        <p:spPr>
+          <a:xfrm>
+            <a:off x="1693015" y="3495313"/>
+            <a:ext cx="4196694" cy="3094982"/>
+          </a:xfrm>
+          <a:prstGeom prst="rect">
+            <a:avLst/>
+          </a:prstGeom>
+        </p:spPr>
+      </p:pic>
+      <p:pic>
+        <p:nvPicPr>
+          <p:cNvPr id="15" name="Imagem 14">
+            <a:extLst>
+              <a:ext uri="{FF2B5EF4-FFF2-40B4-BE49-F238E27FC236}">
+                <a16:creationId xmlns:a16="http://schemas.microsoft.com/office/drawing/2014/main" id="{0E49FF6F-A246-4E8F-896A-F88E4533A477}"/>
+              </a:ext>
+            </a:extLst>
+          </p:cNvPr>
+          <p:cNvPicPr>
+            <a:picLocks noChangeAspect="1"/>
+          </p:cNvPicPr>
+          <p:nvPr/>
+        </p:nvPicPr>
+        <p:blipFill>
+          <a:blip r:embed="rId4"/>
+          <a:stretch>
+            <a:fillRect/>
+          </a:stretch>
+        </p:blipFill>
+        <p:spPr>
+          <a:xfrm>
+            <a:off x="7581474" y="377825"/>
+            <a:ext cx="3475617" cy="6115050"/>
+          </a:xfrm>
+          <a:prstGeom prst="rect">
+            <a:avLst/>
+          </a:prstGeom>
+        </p:spPr>
+      </p:pic>
+      <p:pic>
+        <p:nvPicPr>
+          <p:cNvPr id="16" name="Imagem 15">
+            <a:extLst>
+              <a:ext uri="{FF2B5EF4-FFF2-40B4-BE49-F238E27FC236}">
+                <a16:creationId xmlns:a16="http://schemas.microsoft.com/office/drawing/2014/main" id="{5A98ED5C-27C8-4FAE-BA3D-6B2776B435EF}"/>
+              </a:ext>
+            </a:extLst>
+          </p:cNvPr>
+          <p:cNvPicPr>
+            <a:picLocks noChangeAspect="1"/>
+          </p:cNvPicPr>
+          <p:nvPr/>
+        </p:nvPicPr>
+        <p:blipFill>
+          <a:blip r:embed="rId5"/>
+          <a:stretch>
+            <a:fillRect/>
+          </a:stretch>
+        </p:blipFill>
+        <p:spPr>
+          <a:xfrm>
+            <a:off x="4003255" y="1490518"/>
+            <a:ext cx="3366326" cy="1776672"/>
+          </a:xfrm>
+          <a:prstGeom prst="rect">
+            <a:avLst/>
+          </a:prstGeom>
+        </p:spPr>
+      </p:pic>
+      <p:sp>
+        <p:nvSpPr>
+          <p:cNvPr id="24" name="Retângulo 23">
+            <a:extLst>
+              <a:ext uri="{FF2B5EF4-FFF2-40B4-BE49-F238E27FC236}">
+                <a16:creationId xmlns:a16="http://schemas.microsoft.com/office/drawing/2014/main" id="{31711815-68BD-4455-BECF-D365ED1B6FB6}"/>
+              </a:ext>
+            </a:extLst>
+          </p:cNvPr>
+          <p:cNvSpPr/>
+          <p:nvPr/>
+        </p:nvSpPr>
+        <p:spPr>
+          <a:xfrm>
+            <a:off x="962046" y="2619375"/>
+            <a:ext cx="588148" cy="145256"/>
+          </a:xfrm>
+          <a:prstGeom prst="rect">
+            <a:avLst/>
+          </a:prstGeom>
+          <a:noFill/>
+          <a:ln w="28575">
+            <a:solidFill>
+              <a:srgbClr val="FFC000"/>
+            </a:solidFill>
+          </a:ln>
+        </p:spPr>
+        <p:style>
+          <a:lnRef idx="2">
+            <a:schemeClr val="accent1">
+              <a:shade val="50000"/>
+            </a:schemeClr>
+          </a:lnRef>
+          <a:fillRef idx="1">
+            <a:schemeClr val="accent1"/>
+          </a:fillRef>
+          <a:effectRef idx="0">
+            <a:schemeClr val="accent1"/>
+          </a:effectRef>
+          <a:fontRef idx="minor">
+            <a:schemeClr val="lt1"/>
+          </a:fontRef>
+        </p:style>
+        <p:txBody>
+          <a:bodyPr rtlCol="0" anchor="ctr"/>
+          <a:lstStyle/>
+          <a:p>
+            <a:pPr algn="ctr"/>
+            <a:endParaRPr lang="pt-PT"/>
+          </a:p>
+        </p:txBody>
+      </p:sp>
+      <p:cxnSp>
+        <p:nvCxnSpPr>
+          <p:cNvPr id="18" name="Conexão: Ângulo Reto 17">
+            <a:extLst>
+              <a:ext uri="{FF2B5EF4-FFF2-40B4-BE49-F238E27FC236}">
+                <a16:creationId xmlns:a16="http://schemas.microsoft.com/office/drawing/2014/main" id="{26E791F9-F6BF-4D97-AF9A-BCC9900D3886}"/>
+              </a:ext>
+            </a:extLst>
+          </p:cNvPr>
+          <p:cNvCxnSpPr>
+            <a:stCxn id="24" idx="1"/>
+          </p:cNvCxnSpPr>
+          <p:nvPr/>
+        </p:nvCxnSpPr>
+        <p:spPr>
+          <a:xfrm rot="10800000" flipV="1">
+            <a:off x="609600" y="2692003"/>
+            <a:ext cx="352446" cy="898922"/>
+          </a:xfrm>
+          <a:prstGeom prst="bentConnector2">
+            <a:avLst/>
+          </a:prstGeom>
+          <a:ln w="28575">
+            <a:solidFill>
+              <a:srgbClr val="FFC000"/>
+            </a:solidFill>
+          </a:ln>
+        </p:spPr>
+        <p:style>
+          <a:lnRef idx="1">
+            <a:schemeClr val="accent1"/>
+          </a:lnRef>
+          <a:fillRef idx="0">
+            <a:schemeClr val="accent1"/>
+          </a:fillRef>
+          <a:effectRef idx="0">
+            <a:schemeClr val="accent1"/>
+          </a:effectRef>
+          <a:fontRef idx="minor">
+            <a:schemeClr val="tx1"/>
+          </a:fontRef>
+        </p:style>
+      </p:cxnSp>
+      <p:cxnSp>
+        <p:nvCxnSpPr>
+          <p:cNvPr id="20" name="Conexão reta unidirecional 19">
+            <a:extLst>
+              <a:ext uri="{FF2B5EF4-FFF2-40B4-BE49-F238E27FC236}">
+                <a16:creationId xmlns:a16="http://schemas.microsoft.com/office/drawing/2014/main" id="{A451551B-A39B-4E9B-A54B-AD4F2AA05426}"/>
+              </a:ext>
+            </a:extLst>
+          </p:cNvPr>
+          <p:cNvCxnSpPr/>
+          <p:nvPr/>
+        </p:nvCxnSpPr>
+        <p:spPr>
+          <a:xfrm>
+            <a:off x="609600" y="3581400"/>
+            <a:ext cx="1083415" cy="0"/>
+          </a:xfrm>
+          <a:prstGeom prst="straightConnector1">
+            <a:avLst/>
+          </a:prstGeom>
+          <a:ln w="28575">
+            <a:solidFill>
+              <a:srgbClr val="FFC000"/>
+            </a:solidFill>
+            <a:tailEnd type="triangle"/>
+          </a:ln>
+        </p:spPr>
+        <p:style>
+          <a:lnRef idx="1">
+            <a:schemeClr val="accent1"/>
+          </a:lnRef>
+          <a:fillRef idx="0">
+            <a:schemeClr val="accent1"/>
+          </a:fillRef>
+          <a:effectRef idx="0">
+            <a:schemeClr val="accent1"/>
+          </a:effectRef>
+          <a:fontRef idx="minor">
+            <a:schemeClr val="tx1"/>
+          </a:fontRef>
+        </p:style>
+      </p:cxnSp>
+      <p:sp>
+        <p:nvSpPr>
+          <p:cNvPr id="30" name="Retângulo 29">
+            <a:extLst>
+              <a:ext uri="{FF2B5EF4-FFF2-40B4-BE49-F238E27FC236}">
+                <a16:creationId xmlns:a16="http://schemas.microsoft.com/office/drawing/2014/main" id="{23F38EC4-9192-41BC-9F60-DF6117E152D9}"/>
+              </a:ext>
+            </a:extLst>
+          </p:cNvPr>
+          <p:cNvSpPr/>
+          <p:nvPr/>
+        </p:nvSpPr>
+        <p:spPr>
+          <a:xfrm>
+            <a:off x="2146038" y="5124450"/>
+            <a:ext cx="1225811" cy="419100"/>
+          </a:xfrm>
+          <a:prstGeom prst="rect">
+            <a:avLst/>
+          </a:prstGeom>
+          <a:noFill/>
+          <a:ln w="28575">
+            <a:solidFill>
+              <a:srgbClr val="FFC000"/>
+            </a:solidFill>
+          </a:ln>
+        </p:spPr>
+        <p:style>
+          <a:lnRef idx="2">
+            <a:schemeClr val="accent1">
+              <a:shade val="50000"/>
+            </a:schemeClr>
+          </a:lnRef>
+          <a:fillRef idx="1">
+            <a:schemeClr val="accent1"/>
+          </a:fillRef>
+          <a:effectRef idx="0">
+            <a:schemeClr val="accent1"/>
+          </a:effectRef>
+          <a:fontRef idx="minor">
+            <a:schemeClr val="lt1"/>
+          </a:fontRef>
+        </p:style>
+        <p:txBody>
+          <a:bodyPr rtlCol="0" anchor="ctr"/>
+          <a:lstStyle/>
+          <a:p>
+            <a:pPr algn="ctr"/>
+            <a:endParaRPr lang="pt-PT"/>
+          </a:p>
+        </p:txBody>
+      </p:sp>
+      <p:sp>
+        <p:nvSpPr>
+          <p:cNvPr id="31" name="Retângulo 30">
+            <a:extLst>
+              <a:ext uri="{FF2B5EF4-FFF2-40B4-BE49-F238E27FC236}">
+                <a16:creationId xmlns:a16="http://schemas.microsoft.com/office/drawing/2014/main" id="{A8AC27BA-5F3B-4081-95AB-BA9CD8A49235}"/>
+              </a:ext>
+            </a:extLst>
+          </p:cNvPr>
+          <p:cNvSpPr/>
+          <p:nvPr/>
+        </p:nvSpPr>
+        <p:spPr>
+          <a:xfrm>
+            <a:off x="2153454" y="5815014"/>
+            <a:ext cx="1637907" cy="127922"/>
+          </a:xfrm>
+          <a:prstGeom prst="rect">
+            <a:avLst/>
+          </a:prstGeom>
+          <a:noFill/>
+          <a:ln w="28575">
+            <a:solidFill>
+              <a:srgbClr val="FFC000"/>
+            </a:solidFill>
+          </a:ln>
+        </p:spPr>
+        <p:style>
+          <a:lnRef idx="2">
+            <a:schemeClr val="accent1">
+              <a:shade val="50000"/>
+            </a:schemeClr>
+          </a:lnRef>
+          <a:fillRef idx="1">
+            <a:schemeClr val="accent1"/>
+          </a:fillRef>
+          <a:effectRef idx="0">
+            <a:schemeClr val="accent1"/>
+          </a:effectRef>
+          <a:fontRef idx="minor">
+            <a:schemeClr val="lt1"/>
+          </a:fontRef>
+        </p:style>
+        <p:txBody>
+          <a:bodyPr rtlCol="0" anchor="ctr"/>
+          <a:lstStyle/>
+          <a:p>
+            <a:pPr algn="ctr"/>
+            <a:endParaRPr lang="pt-PT"/>
+          </a:p>
+        </p:txBody>
+      </p:sp>
+      <p:cxnSp>
+        <p:nvCxnSpPr>
+          <p:cNvPr id="22" name="Conexão: Ângulo Reto 21">
+            <a:extLst>
+              <a:ext uri="{FF2B5EF4-FFF2-40B4-BE49-F238E27FC236}">
+                <a16:creationId xmlns:a16="http://schemas.microsoft.com/office/drawing/2014/main" id="{94A5A9C0-7DC4-4494-9B0F-F90B9541F3A1}"/>
+              </a:ext>
+            </a:extLst>
+          </p:cNvPr>
+          <p:cNvCxnSpPr>
+            <a:cxnSpLocks/>
+          </p:cNvCxnSpPr>
+          <p:nvPr/>
+        </p:nvCxnSpPr>
+        <p:spPr>
+          <a:xfrm rot="10800000">
+            <a:off x="1428750" y="4270378"/>
+            <a:ext cx="724705" cy="1611773"/>
+          </a:xfrm>
+          <a:prstGeom prst="bentConnector2">
+            <a:avLst/>
+          </a:prstGeom>
+          <a:ln w="28575">
+            <a:solidFill>
+              <a:srgbClr val="FFC000"/>
+            </a:solidFill>
+          </a:ln>
+        </p:spPr>
+        <p:style>
+          <a:lnRef idx="1">
+            <a:schemeClr val="accent1"/>
+          </a:lnRef>
+          <a:fillRef idx="0">
+            <a:schemeClr val="accent1"/>
+          </a:fillRef>
+          <a:effectRef idx="0">
+            <a:schemeClr val="accent1"/>
+          </a:effectRef>
+          <a:fontRef idx="minor">
+            <a:schemeClr val="tx1"/>
+          </a:fontRef>
+        </p:style>
+      </p:cxnSp>
+      <p:cxnSp>
+        <p:nvCxnSpPr>
+          <p:cNvPr id="46" name="Conexão: Ângulo Reto 45">
+            <a:extLst>
+              <a:ext uri="{FF2B5EF4-FFF2-40B4-BE49-F238E27FC236}">
+                <a16:creationId xmlns:a16="http://schemas.microsoft.com/office/drawing/2014/main" id="{3FD1238E-8B88-4E6A-85FB-4AA7CED9F276}"/>
+              </a:ext>
+            </a:extLst>
+          </p:cNvPr>
+          <p:cNvCxnSpPr>
+            <a:cxnSpLocks/>
+          </p:cNvCxnSpPr>
+          <p:nvPr/>
+        </p:nvCxnSpPr>
+        <p:spPr>
+          <a:xfrm rot="5400000" flipH="1" flipV="1">
+            <a:off x="1340213" y="1702165"/>
+            <a:ext cx="2663098" cy="2486025"/>
+          </a:xfrm>
+          <a:prstGeom prst="bentConnector3">
+            <a:avLst>
+              <a:gd name="adj1" fmla="val 642"/>
+            </a:avLst>
+          </a:prstGeom>
+          <a:ln w="28575">
+            <a:solidFill>
+              <a:srgbClr val="FFC000"/>
+            </a:solidFill>
+          </a:ln>
+        </p:spPr>
+        <p:style>
+          <a:lnRef idx="1">
+            <a:schemeClr val="accent1"/>
+          </a:lnRef>
+          <a:fillRef idx="0">
+            <a:schemeClr val="accent1"/>
+          </a:fillRef>
+          <a:effectRef idx="0">
+            <a:schemeClr val="accent1"/>
+          </a:effectRef>
+          <a:fontRef idx="minor">
+            <a:schemeClr val="tx1"/>
+          </a:fontRef>
+        </p:style>
+      </p:cxnSp>
+      <p:cxnSp>
+        <p:nvCxnSpPr>
+          <p:cNvPr id="53" name="Conexão reta unidirecional 52">
+            <a:extLst>
+              <a:ext uri="{FF2B5EF4-FFF2-40B4-BE49-F238E27FC236}">
+                <a16:creationId xmlns:a16="http://schemas.microsoft.com/office/drawing/2014/main" id="{104CB254-2FFA-43B6-8305-9DF66EED4FEF}"/>
+              </a:ext>
+            </a:extLst>
+          </p:cNvPr>
+          <p:cNvCxnSpPr>
+            <a:cxnSpLocks/>
+          </p:cNvCxnSpPr>
+          <p:nvPr/>
+        </p:nvCxnSpPr>
+        <p:spPr>
+          <a:xfrm>
+            <a:off x="3914775" y="1613628"/>
+            <a:ext cx="88480" cy="0"/>
+          </a:xfrm>
+          <a:prstGeom prst="straightConnector1">
+            <a:avLst/>
+          </a:prstGeom>
+          <a:ln w="28575">
+            <a:solidFill>
+              <a:srgbClr val="FFC000"/>
+            </a:solidFill>
+            <a:tailEnd type="triangle"/>
+          </a:ln>
+        </p:spPr>
+        <p:style>
+          <a:lnRef idx="1">
+            <a:schemeClr val="accent1"/>
+          </a:lnRef>
+          <a:fillRef idx="0">
+            <a:schemeClr val="accent1"/>
+          </a:fillRef>
+          <a:effectRef idx="0">
+            <a:schemeClr val="accent1"/>
+          </a:effectRef>
+          <a:fontRef idx="minor">
+            <a:schemeClr val="tx1"/>
+          </a:fontRef>
+        </p:style>
+      </p:cxnSp>
+      <p:cxnSp>
+        <p:nvCxnSpPr>
+          <p:cNvPr id="57" name="Conexão: Ângulo Reto 56">
+            <a:extLst>
+              <a:ext uri="{FF2B5EF4-FFF2-40B4-BE49-F238E27FC236}">
+                <a16:creationId xmlns:a16="http://schemas.microsoft.com/office/drawing/2014/main" id="{6115FAFD-106B-4749-867A-D173E10CCFD5}"/>
+              </a:ext>
+            </a:extLst>
+          </p:cNvPr>
+          <p:cNvCxnSpPr>
+            <a:stCxn id="30" idx="3"/>
+          </p:cNvCxnSpPr>
+          <p:nvPr/>
+        </p:nvCxnSpPr>
+        <p:spPr>
+          <a:xfrm flipV="1">
+            <a:off x="3371849" y="476250"/>
+            <a:ext cx="4105276" cy="4857750"/>
+          </a:xfrm>
+          <a:prstGeom prst="bentConnector2">
+            <a:avLst/>
+          </a:prstGeom>
+          <a:ln w="28575">
+            <a:solidFill>
+              <a:srgbClr val="FFC000"/>
+            </a:solidFill>
+          </a:ln>
+        </p:spPr>
+        <p:style>
+          <a:lnRef idx="1">
+            <a:schemeClr val="accent1"/>
+          </a:lnRef>
+          <a:fillRef idx="0">
+            <a:schemeClr val="accent1"/>
+          </a:fillRef>
+          <a:effectRef idx="0">
+            <a:schemeClr val="accent1"/>
+          </a:effectRef>
+          <a:fontRef idx="minor">
+            <a:schemeClr val="tx1"/>
+          </a:fontRef>
+        </p:style>
+      </p:cxnSp>
+      <p:cxnSp>
+        <p:nvCxnSpPr>
+          <p:cNvPr id="58" name="Conexão reta unidirecional 57">
+            <a:extLst>
+              <a:ext uri="{FF2B5EF4-FFF2-40B4-BE49-F238E27FC236}">
+                <a16:creationId xmlns:a16="http://schemas.microsoft.com/office/drawing/2014/main" id="{4856A8CB-1BA7-4DF5-B311-9F08BFCF0911}"/>
+              </a:ext>
+            </a:extLst>
+          </p:cNvPr>
+          <p:cNvCxnSpPr>
+            <a:cxnSpLocks/>
+          </p:cNvCxnSpPr>
+          <p:nvPr/>
+        </p:nvCxnSpPr>
+        <p:spPr>
+          <a:xfrm>
+            <a:off x="7488231" y="470627"/>
+            <a:ext cx="88480" cy="0"/>
+          </a:xfrm>
+          <a:prstGeom prst="straightConnector1">
+            <a:avLst/>
+          </a:prstGeom>
+          <a:ln w="28575">
+            <a:solidFill>
+              <a:srgbClr val="FFC000"/>
+            </a:solidFill>
+            <a:tailEnd type="triangle"/>
+          </a:ln>
+        </p:spPr>
+        <p:style>
+          <a:lnRef idx="1">
+            <a:schemeClr val="accent1"/>
+          </a:lnRef>
+          <a:fillRef idx="0">
+            <a:schemeClr val="accent1"/>
+          </a:fillRef>
+          <a:effectRef idx="0">
+            <a:schemeClr val="accent1"/>
+          </a:effectRef>
+          <a:fontRef idx="minor">
+            <a:schemeClr val="tx1"/>
+          </a:fontRef>
+        </p:style>
+      </p:cxnSp>
     </p:spTree>
     <p:extLst>
       <p:ext uri="{BB962C8B-B14F-4D97-AF65-F5344CB8AC3E}">
-        <p14:creationId xmlns:p14="http://schemas.microsoft.com/office/powerpoint/2010/main" val="760761432"/>
+        <p14:creationId xmlns:p14="http://schemas.microsoft.com/office/powerpoint/2010/main" val="1991581089"/>
       </p:ext>
     </p:extLst>
   </p:cSld>
   <p:clrMapOvr>
     <a:masterClrMapping/>
   </p:clrMapOvr>
+  <p:transition spd="slow">
+    <p:push dir="u"/>
+  </p:transition>
+</p:sld>
+</file>
+
+<file path=ppt/slides/slide11.xml><?xml version="1.0" encoding="utf-8"?>
+<p:sld xmlns:a="http://schemas.openxmlformats.org/drawingml/2006/main" xmlns:r="http://schemas.openxmlformats.org/officeDocument/2006/relationships" xmlns:p="http://schemas.openxmlformats.org/presentationml/2006/main">
+  <p:cSld>
+    <p:spTree>
+      <p:nvGrpSpPr>
+        <p:cNvPr id="1" name=""/>
+        <p:cNvGrpSpPr/>
+        <p:nvPr/>
+      </p:nvGrpSpPr>
+      <p:grpSpPr>
+        <a:xfrm>
+          <a:off x="0" y="0"/>
+          <a:ext cx="0" cy="0"/>
+          <a:chOff x="0" y="0"/>
+          <a:chExt cx="0" cy="0"/>
+        </a:xfrm>
+      </p:grpSpPr>
+      <p:sp>
+        <p:nvSpPr>
+          <p:cNvPr id="2" name="Title 1">
+            <a:extLst>
+              <a:ext uri="{FF2B5EF4-FFF2-40B4-BE49-F238E27FC236}">
+                <a16:creationId xmlns:a16="http://schemas.microsoft.com/office/drawing/2014/main" id="{712BBEBA-BC94-4022-A529-082895C94004}"/>
+              </a:ext>
+            </a:extLst>
+          </p:cNvPr>
+          <p:cNvSpPr>
+            <a:spLocks noGrp="1"/>
+          </p:cNvSpPr>
+          <p:nvPr>
+            <p:ph type="title"/>
+          </p:nvPr>
+        </p:nvSpPr>
+        <p:spPr/>
+        <p:txBody>
+          <a:bodyPr/>
+          <a:lstStyle/>
+          <a:p>
+            <a:r>
+              <a:rPr lang="en-US" dirty="0">
+                <a:solidFill>
+                  <a:srgbClr val="61DBFB"/>
+                </a:solidFill>
+                <a:cs typeface="Calibri Light"/>
+              </a:rPr>
+              <a:t>Code examples</a:t>
+            </a:r>
+          </a:p>
+        </p:txBody>
+      </p:sp>
+      <p:sp>
+        <p:nvSpPr>
+          <p:cNvPr id="4" name="CaixaDeTexto 3">
+            <a:extLst>
+              <a:ext uri="{FF2B5EF4-FFF2-40B4-BE49-F238E27FC236}">
+                <a16:creationId xmlns:a16="http://schemas.microsoft.com/office/drawing/2014/main" id="{F5CEBF9C-5BE0-4BC6-A7C5-D88F2C8419EB}"/>
+              </a:ext>
+            </a:extLst>
+          </p:cNvPr>
+          <p:cNvSpPr txBox="1"/>
+          <p:nvPr/>
+        </p:nvSpPr>
+        <p:spPr>
+          <a:xfrm>
+            <a:off x="766029" y="1490518"/>
+            <a:ext cx="418704" cy="646331"/>
+          </a:xfrm>
+          <a:prstGeom prst="rect">
+            <a:avLst/>
+          </a:prstGeom>
+          <a:noFill/>
+        </p:spPr>
+        <p:txBody>
+          <a:bodyPr wrap="none" rtlCol="0">
+            <a:spAutoFit/>
+          </a:bodyPr>
+          <a:lstStyle/>
+          <a:p>
+            <a:r>
+              <a:rPr lang="pt-PT" sz="3600" b="1" dirty="0">
+                <a:solidFill>
+                  <a:schemeClr val="bg1"/>
+                </a:solidFill>
+                <a:effectLst>
+                  <a:outerShdw blurRad="38100" dist="38100" dir="2700000" algn="tl">
+                    <a:srgbClr val="000000">
+                      <a:alpha val="43137"/>
+                    </a:srgbClr>
+                  </a:outerShdw>
+                </a:effectLst>
+                <a:highlight>
+                  <a:srgbClr val="008080"/>
+                </a:highlight>
+              </a:rPr>
+              <a:t>2</a:t>
+            </a:r>
+            <a:endParaRPr lang="pt-PT" b="1" dirty="0">
+              <a:solidFill>
+                <a:schemeClr val="bg1"/>
+              </a:solidFill>
+              <a:effectLst>
+                <a:outerShdw blurRad="38100" dist="38100" dir="2700000" algn="tl">
+                  <a:srgbClr val="000000">
+                    <a:alpha val="43137"/>
+                  </a:srgbClr>
+                </a:outerShdw>
+              </a:effectLst>
+              <a:highlight>
+                <a:srgbClr val="008080"/>
+              </a:highlight>
+            </a:endParaRPr>
+          </a:p>
+        </p:txBody>
+      </p:sp>
+      <p:sp>
+        <p:nvSpPr>
+          <p:cNvPr id="40" name="CaixaDeTexto 39">
+            <a:extLst>
+              <a:ext uri="{FF2B5EF4-FFF2-40B4-BE49-F238E27FC236}">
+                <a16:creationId xmlns:a16="http://schemas.microsoft.com/office/drawing/2014/main" id="{A3638077-DE35-4FB8-84DF-A01C51CC4FA5}"/>
+              </a:ext>
+            </a:extLst>
+          </p:cNvPr>
+          <p:cNvSpPr txBox="1"/>
+          <p:nvPr/>
+        </p:nvSpPr>
+        <p:spPr>
+          <a:xfrm>
+            <a:off x="1256904" y="1613628"/>
+            <a:ext cx="1183209" cy="400110"/>
+          </a:xfrm>
+          <a:prstGeom prst="rect">
+            <a:avLst/>
+          </a:prstGeom>
+          <a:noFill/>
+        </p:spPr>
+        <p:txBody>
+          <a:bodyPr wrap="none" rtlCol="0">
+            <a:spAutoFit/>
+          </a:bodyPr>
+          <a:lstStyle/>
+          <a:p>
+            <a:r>
+              <a:rPr lang="en-US" sz="2000" b="1" dirty="0">
+                <a:solidFill>
+                  <a:schemeClr val="bg1"/>
+                </a:solidFill>
+                <a:effectLst>
+                  <a:outerShdw blurRad="38100" dist="38100" dir="2700000" algn="tl">
+                    <a:srgbClr val="000000">
+                      <a:alpha val="43137"/>
+                    </a:srgbClr>
+                  </a:outerShdw>
+                </a:effectLst>
+              </a:rPr>
+              <a:t>TODO list</a:t>
+            </a:r>
+            <a:endParaRPr lang="pt-PT" sz="2000" b="1" dirty="0">
+              <a:solidFill>
+                <a:schemeClr val="bg1"/>
+              </a:solidFill>
+              <a:effectLst>
+                <a:outerShdw blurRad="38100" dist="38100" dir="2700000" algn="tl">
+                  <a:srgbClr val="000000">
+                    <a:alpha val="43137"/>
+                  </a:srgbClr>
+                </a:outerShdw>
+              </a:effectLst>
+            </a:endParaRPr>
+          </a:p>
+        </p:txBody>
+      </p:sp>
+    </p:spTree>
+    <p:extLst>
+      <p:ext uri="{BB962C8B-B14F-4D97-AF65-F5344CB8AC3E}">
+        <p14:creationId xmlns:p14="http://schemas.microsoft.com/office/powerpoint/2010/main" val="659887849"/>
+      </p:ext>
+    </p:extLst>
+  </p:cSld>
+  <p:clrMapOvr>
+    <a:masterClrMapping/>
+  </p:clrMapOvr>
+  <p:transition spd="slow">
+    <p:push dir="u"/>
+  </p:transition>
 </p:sld>
 </file>
 
@@ -4783,7 +5554,7 @@
         <p:spPr>
           <a:xfrm>
             <a:off x="835231" y="4981698"/>
-            <a:ext cx="10501745" cy="923330"/>
+            <a:ext cx="10501745" cy="1200329"/>
           </a:xfrm>
           <a:prstGeom prst="rect">
             <a:avLst/>
@@ -4809,7 +5580,114 @@
                   <a:srgbClr val="FFFFFF"/>
                 </a:solidFill>
               </a:rPr>
-              <a:t>The document is rendered a first time using ReactDOM.render and passing the main component which calls a method that returns the page structure. To update the interface within each component, this method must be called again with only the elements that are being updated (i.e.: just a &lt;button&gt;&lt;/button&gt;).</a:t>
+              <a:t>The document is rendered a first time using </a:t>
+            </a:r>
+            <a:r>
+              <a:rPr lang="en-US" dirty="0" err="1">
+                <a:solidFill>
+                  <a:srgbClr val="FFFFFF"/>
+                </a:solidFill>
+              </a:rPr>
+              <a:t>ReactDOM.render</a:t>
+            </a:r>
+            <a:r>
+              <a:rPr lang="en-US" dirty="0">
+                <a:solidFill>
+                  <a:srgbClr val="FFFFFF"/>
+                </a:solidFill>
+              </a:rPr>
+              <a:t> and by “passing” the component which renders the first document elements. To update the stored data in a certain component and re-render the interface, you can either use the function </a:t>
+            </a:r>
+            <a:r>
+              <a:rPr lang="en-US" i="1" dirty="0" err="1">
+                <a:solidFill>
+                  <a:srgbClr val="40A2DB"/>
+                </a:solidFill>
+                <a:effectLst>
+                  <a:outerShdw blurRad="38100" dist="38100" dir="2700000" algn="tl">
+                    <a:srgbClr val="000000">
+                      <a:alpha val="43137"/>
+                    </a:srgbClr>
+                  </a:outerShdw>
+                </a:effectLst>
+              </a:rPr>
+              <a:t>setState</a:t>
+            </a:r>
+            <a:r>
+              <a:rPr lang="en-US" i="1" dirty="0">
+                <a:solidFill>
+                  <a:srgbClr val="40A2DB"/>
+                </a:solidFill>
+                <a:effectLst>
+                  <a:outerShdw blurRad="38100" dist="38100" dir="2700000" algn="tl">
+                    <a:srgbClr val="000000">
+                      <a:alpha val="43137"/>
+                    </a:srgbClr>
+                  </a:outerShdw>
+                </a:effectLst>
+              </a:rPr>
+              <a:t>()</a:t>
+            </a:r>
+            <a:r>
+              <a:rPr lang="en-US" i="1" dirty="0">
+                <a:solidFill>
+                  <a:srgbClr val="FFFFFF"/>
+                </a:solidFill>
+                <a:effectLst>
+                  <a:outerShdw blurRad="38100" dist="38100" dir="2700000" algn="tl">
+                    <a:srgbClr val="000000">
+                      <a:alpha val="43137"/>
+                    </a:srgbClr>
+                  </a:outerShdw>
+                </a:effectLst>
+              </a:rPr>
+              <a:t> </a:t>
+            </a:r>
+            <a:r>
+              <a:rPr lang="en-US" dirty="0">
+                <a:solidFill>
+                  <a:srgbClr val="FFFFFF"/>
+                </a:solidFill>
+              </a:rPr>
+              <a:t>or, if that component doesn’t have a state, you can just use the function </a:t>
+            </a:r>
+            <a:r>
+              <a:rPr lang="en-US" i="1" dirty="0" err="1">
+                <a:solidFill>
+                  <a:srgbClr val="40A2DB"/>
+                </a:solidFill>
+                <a:effectLst>
+                  <a:outerShdw blurRad="38100" dist="38100" dir="2700000" algn="tl">
+                    <a:srgbClr val="000000">
+                      <a:alpha val="43137"/>
+                    </a:srgbClr>
+                  </a:outerShdw>
+                </a:effectLst>
+              </a:rPr>
+              <a:t>forceUpdate</a:t>
+            </a:r>
+            <a:r>
+              <a:rPr lang="en-US" i="1" dirty="0">
+                <a:solidFill>
+                  <a:srgbClr val="40A2DB"/>
+                </a:solidFill>
+                <a:effectLst>
+                  <a:outerShdw blurRad="38100" dist="38100" dir="2700000" algn="tl">
+                    <a:srgbClr val="000000">
+                      <a:alpha val="43137"/>
+                    </a:srgbClr>
+                  </a:outerShdw>
+                </a:effectLst>
+              </a:rPr>
+              <a:t>()</a:t>
+            </a:r>
+            <a:r>
+              <a:rPr lang="en-US" dirty="0">
+                <a:solidFill>
+                  <a:srgbClr val="FFFFFF"/>
+                </a:solidFill>
+              </a:rPr>
+              <a:t>. </a:t>
             </a:r>
             <a:endParaRPr lang="en-US" dirty="0">
               <a:solidFill>
@@ -7087,7 +7965,23 @@
                   <a:schemeClr val="bg1"/>
                 </a:solidFill>
               </a:rPr>
-              <a:t> with the information of the data in each square of the tic tac toe game. It also has a function that deals with a click event, </a:t>
+              <a:t> with the information of the data in each square of the </a:t>
+            </a:r>
+            <a:r>
+              <a:rPr lang="en-US" dirty="0" err="1">
+                <a:solidFill>
+                  <a:schemeClr val="bg1"/>
+                </a:solidFill>
+              </a:rPr>
+              <a:t>tictactoe</a:t>
+            </a:r>
+            <a:r>
+              <a:rPr lang="en-US" dirty="0">
+                <a:solidFill>
+                  <a:schemeClr val="bg1"/>
+                </a:solidFill>
+              </a:rPr>
+              <a:t> game. It also has a function that deals with a click event, </a:t>
             </a:r>
             <a:r>
               <a:rPr lang="en-US" i="1" dirty="0" err="1">
@@ -7442,7 +8336,7 @@
                 </a:solidFill>
                 <a:cs typeface="Calibri"/>
               </a:rPr>
-              <a:t>There is a very good connection between parent a children components, making it easy to access values within one another through props.</a:t>
+              <a:t>There is a very good connection between parent a children components, making it easy to access values within one another through props or callback functions.</a:t>
             </a:r>
           </a:p>
           <a:p>
@@ -7455,6 +8349,653 @@
           </a:p>
         </p:txBody>
       </p:sp>
+      <p:sp>
+        <p:nvSpPr>
+          <p:cNvPr id="4" name="CaixaDeTexto 3">
+            <a:extLst>
+              <a:ext uri="{FF2B5EF4-FFF2-40B4-BE49-F238E27FC236}">
+                <a16:creationId xmlns:a16="http://schemas.microsoft.com/office/drawing/2014/main" id="{F6FAE366-24FE-4ECF-9B81-082FE664D172}"/>
+              </a:ext>
+            </a:extLst>
+          </p:cNvPr>
+          <p:cNvSpPr txBox="1"/>
+          <p:nvPr/>
+        </p:nvSpPr>
+        <p:spPr>
+          <a:xfrm>
+            <a:off x="1052576" y="4410075"/>
+            <a:ext cx="1161152" cy="707886"/>
+          </a:xfrm>
+          <a:prstGeom prst="rect">
+            <a:avLst/>
+          </a:prstGeom>
+          <a:noFill/>
+        </p:spPr>
+        <p:txBody>
+          <a:bodyPr wrap="none" rtlCol="0">
+            <a:spAutoFit/>
+          </a:bodyPr>
+          <a:lstStyle/>
+          <a:p>
+            <a:pPr algn="ctr"/>
+            <a:r>
+              <a:rPr lang="en-US" sz="2400" b="1" u="sng" dirty="0">
+                <a:solidFill>
+                  <a:schemeClr val="accent4">
+                    <a:lumMod val="40000"/>
+                    <a:lumOff val="60000"/>
+                  </a:schemeClr>
+                </a:solidFill>
+              </a:rPr>
+              <a:t>Parent</a:t>
+            </a:r>
+          </a:p>
+          <a:p>
+            <a:pPr algn="ctr"/>
+            <a:r>
+              <a:rPr lang="en-US" sz="1600" i="1" dirty="0">
+                <a:solidFill>
+                  <a:schemeClr val="bg1"/>
+                </a:solidFill>
+              </a:rPr>
+              <a:t>component</a:t>
+            </a:r>
+            <a:endParaRPr lang="pt-PT" sz="2400" i="1" dirty="0">
+              <a:solidFill>
+                <a:schemeClr val="bg1"/>
+              </a:solidFill>
+            </a:endParaRPr>
+          </a:p>
+        </p:txBody>
+      </p:sp>
+      <p:sp>
+        <p:nvSpPr>
+          <p:cNvPr id="6" name="CaixaDeTexto 5">
+            <a:extLst>
+              <a:ext uri="{FF2B5EF4-FFF2-40B4-BE49-F238E27FC236}">
+                <a16:creationId xmlns:a16="http://schemas.microsoft.com/office/drawing/2014/main" id="{E8F3710E-DE95-4343-8631-7DE5E8A24D07}"/>
+              </a:ext>
+            </a:extLst>
+          </p:cNvPr>
+          <p:cNvSpPr txBox="1"/>
+          <p:nvPr/>
+        </p:nvSpPr>
+        <p:spPr>
+          <a:xfrm>
+            <a:off x="4072001" y="4410075"/>
+            <a:ext cx="1161152" cy="707886"/>
+          </a:xfrm>
+          <a:prstGeom prst="rect">
+            <a:avLst/>
+          </a:prstGeom>
+          <a:noFill/>
+        </p:spPr>
+        <p:txBody>
+          <a:bodyPr wrap="none" rtlCol="0">
+            <a:spAutoFit/>
+          </a:bodyPr>
+          <a:lstStyle/>
+          <a:p>
+            <a:pPr algn="ctr"/>
+            <a:r>
+              <a:rPr lang="en-US" sz="2400" b="1" u="sng" dirty="0">
+                <a:solidFill>
+                  <a:schemeClr val="accent4">
+                    <a:lumMod val="40000"/>
+                    <a:lumOff val="60000"/>
+                  </a:schemeClr>
+                </a:solidFill>
+              </a:rPr>
+              <a:t>Child</a:t>
+            </a:r>
+          </a:p>
+          <a:p>
+            <a:pPr algn="ctr"/>
+            <a:r>
+              <a:rPr lang="en-US" sz="1600" i="1" dirty="0">
+                <a:solidFill>
+                  <a:schemeClr val="bg1"/>
+                </a:solidFill>
+              </a:rPr>
+              <a:t>component</a:t>
+            </a:r>
+            <a:endParaRPr lang="pt-PT" sz="2400" i="1" dirty="0">
+              <a:solidFill>
+                <a:schemeClr val="bg1"/>
+              </a:solidFill>
+            </a:endParaRPr>
+          </a:p>
+        </p:txBody>
+      </p:sp>
+      <p:cxnSp>
+        <p:nvCxnSpPr>
+          <p:cNvPr id="8" name="Conexão reta unidirecional 7">
+            <a:extLst>
+              <a:ext uri="{FF2B5EF4-FFF2-40B4-BE49-F238E27FC236}">
+                <a16:creationId xmlns:a16="http://schemas.microsoft.com/office/drawing/2014/main" id="{25F71687-B70B-43CF-BEEE-596FE92F5707}"/>
+              </a:ext>
+            </a:extLst>
+          </p:cNvPr>
+          <p:cNvCxnSpPr>
+            <a:stCxn id="4" idx="3"/>
+            <a:endCxn id="6" idx="1"/>
+          </p:cNvCxnSpPr>
+          <p:nvPr/>
+        </p:nvCxnSpPr>
+        <p:spPr>
+          <a:xfrm>
+            <a:off x="2213728" y="4764018"/>
+            <a:ext cx="1858273" cy="0"/>
+          </a:xfrm>
+          <a:prstGeom prst="straightConnector1">
+            <a:avLst/>
+          </a:prstGeom>
+          <a:ln w="76200">
+            <a:solidFill>
+              <a:srgbClr val="DB4848"/>
+            </a:solidFill>
+            <a:tailEnd type="triangle"/>
+          </a:ln>
+        </p:spPr>
+        <p:style>
+          <a:lnRef idx="1">
+            <a:schemeClr val="accent1"/>
+          </a:lnRef>
+          <a:fillRef idx="0">
+            <a:schemeClr val="accent1"/>
+          </a:fillRef>
+          <a:effectRef idx="0">
+            <a:schemeClr val="accent1"/>
+          </a:effectRef>
+          <a:fontRef idx="minor">
+            <a:schemeClr val="tx1"/>
+          </a:fontRef>
+        </p:style>
+      </p:cxnSp>
+      <p:sp>
+        <p:nvSpPr>
+          <p:cNvPr id="10" name="CaixaDeTexto 9">
+            <a:extLst>
+              <a:ext uri="{FF2B5EF4-FFF2-40B4-BE49-F238E27FC236}">
+                <a16:creationId xmlns:a16="http://schemas.microsoft.com/office/drawing/2014/main" id="{AF063A6A-F087-4AAA-826B-C5C95B8A5CDF}"/>
+              </a:ext>
+            </a:extLst>
+          </p:cNvPr>
+          <p:cNvSpPr txBox="1"/>
+          <p:nvPr/>
+        </p:nvSpPr>
+        <p:spPr>
+          <a:xfrm>
+            <a:off x="2520546" y="4382232"/>
+            <a:ext cx="1244636" cy="338554"/>
+          </a:xfrm>
+          <a:prstGeom prst="rect">
+            <a:avLst/>
+          </a:prstGeom>
+          <a:noFill/>
+        </p:spPr>
+        <p:txBody>
+          <a:bodyPr wrap="none" rtlCol="0">
+            <a:spAutoFit/>
+          </a:bodyPr>
+          <a:lstStyle/>
+          <a:p>
+            <a:r>
+              <a:rPr lang="en-US" sz="1600" i="1" dirty="0">
+                <a:solidFill>
+                  <a:schemeClr val="bg1"/>
+                </a:solidFill>
+              </a:rPr>
+              <a:t>passing data</a:t>
+            </a:r>
+            <a:endParaRPr lang="pt-PT" sz="1600" i="1" dirty="0">
+              <a:solidFill>
+                <a:schemeClr val="bg1"/>
+              </a:solidFill>
+            </a:endParaRPr>
+          </a:p>
+        </p:txBody>
+      </p:sp>
+      <p:sp>
+        <p:nvSpPr>
+          <p:cNvPr id="11" name="CaixaDeTexto 10">
+            <a:extLst>
+              <a:ext uri="{FF2B5EF4-FFF2-40B4-BE49-F238E27FC236}">
+                <a16:creationId xmlns:a16="http://schemas.microsoft.com/office/drawing/2014/main" id="{AC672ACE-27EB-437B-85A4-CEA446B198EB}"/>
+              </a:ext>
+            </a:extLst>
+          </p:cNvPr>
+          <p:cNvSpPr txBox="1"/>
+          <p:nvPr/>
+        </p:nvSpPr>
+        <p:spPr>
+          <a:xfrm>
+            <a:off x="2711977" y="5186248"/>
+            <a:ext cx="861774" cy="270267"/>
+          </a:xfrm>
+          <a:prstGeom prst="rect">
+            <a:avLst/>
+          </a:prstGeom>
+          <a:noFill/>
+        </p:spPr>
+        <p:txBody>
+          <a:bodyPr vert="eaVert" wrap="none" rtlCol="0">
+            <a:spAutoFit/>
+          </a:bodyPr>
+          <a:lstStyle/>
+          <a:p>
+            <a:r>
+              <a:rPr lang="en-US" sz="4400" dirty="0">
+                <a:solidFill>
+                  <a:schemeClr val="bg1"/>
+                </a:solidFill>
+              </a:rPr>
+              <a:t>}</a:t>
+            </a:r>
+            <a:endParaRPr lang="pt-PT" dirty="0">
+              <a:solidFill>
+                <a:schemeClr val="bg1"/>
+              </a:solidFill>
+            </a:endParaRPr>
+          </a:p>
+        </p:txBody>
+      </p:sp>
+      <p:sp>
+        <p:nvSpPr>
+          <p:cNvPr id="12" name="CaixaDeTexto 11">
+            <a:extLst>
+              <a:ext uri="{FF2B5EF4-FFF2-40B4-BE49-F238E27FC236}">
+                <a16:creationId xmlns:a16="http://schemas.microsoft.com/office/drawing/2014/main" id="{E6E89C9E-649A-4B26-AF54-D48A14D69D1F}"/>
+              </a:ext>
+            </a:extLst>
+          </p:cNvPr>
+          <p:cNvSpPr txBox="1"/>
+          <p:nvPr/>
+        </p:nvSpPr>
+        <p:spPr>
+          <a:xfrm>
+            <a:off x="2351012" y="5694078"/>
+            <a:ext cx="1583703" cy="369332"/>
+          </a:xfrm>
+          <a:prstGeom prst="rect">
+            <a:avLst/>
+          </a:prstGeom>
+          <a:noFill/>
+        </p:spPr>
+        <p:txBody>
+          <a:bodyPr wrap="none" rtlCol="0">
+            <a:spAutoFit/>
+          </a:bodyPr>
+          <a:lstStyle/>
+          <a:p>
+            <a:r>
+              <a:rPr lang="en-US" dirty="0">
+                <a:solidFill>
+                  <a:schemeClr val="bg1"/>
+                </a:solidFill>
+              </a:rPr>
+              <a:t>usage of </a:t>
+            </a:r>
+            <a:r>
+              <a:rPr lang="en-US" b="1" dirty="0">
+                <a:solidFill>
+                  <a:schemeClr val="bg1"/>
+                </a:solidFill>
+                <a:effectLst>
+                  <a:outerShdw blurRad="38100" dist="38100" dir="2700000" algn="tl">
+                    <a:srgbClr val="000000">
+                      <a:alpha val="43137"/>
+                    </a:srgbClr>
+                  </a:outerShdw>
+                </a:effectLst>
+                <a:highlight>
+                  <a:srgbClr val="DB4848"/>
+                </a:highlight>
+              </a:rPr>
+              <a:t>props</a:t>
+            </a:r>
+            <a:endParaRPr lang="pt-PT" b="1" dirty="0">
+              <a:solidFill>
+                <a:schemeClr val="bg1"/>
+              </a:solidFill>
+              <a:effectLst>
+                <a:outerShdw blurRad="38100" dist="38100" dir="2700000" algn="tl">
+                  <a:srgbClr val="000000">
+                    <a:alpha val="43137"/>
+                  </a:srgbClr>
+                </a:outerShdw>
+              </a:effectLst>
+              <a:highlight>
+                <a:srgbClr val="DB4848"/>
+              </a:highlight>
+            </a:endParaRPr>
+          </a:p>
+        </p:txBody>
+      </p:sp>
+      <p:sp>
+        <p:nvSpPr>
+          <p:cNvPr id="13" name="CaixaDeTexto 12">
+            <a:extLst>
+              <a:ext uri="{FF2B5EF4-FFF2-40B4-BE49-F238E27FC236}">
+                <a16:creationId xmlns:a16="http://schemas.microsoft.com/office/drawing/2014/main" id="{F519B71D-BB19-48FE-8B1A-71A9274A2BF0}"/>
+              </a:ext>
+            </a:extLst>
+          </p:cNvPr>
+          <p:cNvSpPr txBox="1"/>
+          <p:nvPr/>
+        </p:nvSpPr>
+        <p:spPr>
+          <a:xfrm>
+            <a:off x="6262751" y="4410075"/>
+            <a:ext cx="1161152" cy="707886"/>
+          </a:xfrm>
+          <a:prstGeom prst="rect">
+            <a:avLst/>
+          </a:prstGeom>
+          <a:noFill/>
+        </p:spPr>
+        <p:txBody>
+          <a:bodyPr wrap="none" rtlCol="0">
+            <a:spAutoFit/>
+          </a:bodyPr>
+          <a:lstStyle/>
+          <a:p>
+            <a:pPr algn="ctr"/>
+            <a:r>
+              <a:rPr lang="en-US" sz="2400" b="1" u="sng" dirty="0">
+                <a:solidFill>
+                  <a:schemeClr val="accent4">
+                    <a:lumMod val="40000"/>
+                    <a:lumOff val="60000"/>
+                  </a:schemeClr>
+                </a:solidFill>
+              </a:rPr>
+              <a:t>Parent</a:t>
+            </a:r>
+          </a:p>
+          <a:p>
+            <a:pPr algn="ctr"/>
+            <a:r>
+              <a:rPr lang="en-US" sz="1600" i="1" dirty="0">
+                <a:solidFill>
+                  <a:schemeClr val="bg1"/>
+                </a:solidFill>
+              </a:rPr>
+              <a:t>component</a:t>
+            </a:r>
+            <a:endParaRPr lang="pt-PT" sz="2400" i="1" dirty="0">
+              <a:solidFill>
+                <a:schemeClr val="bg1"/>
+              </a:solidFill>
+            </a:endParaRPr>
+          </a:p>
+        </p:txBody>
+      </p:sp>
+      <p:sp>
+        <p:nvSpPr>
+          <p:cNvPr id="14" name="CaixaDeTexto 13">
+            <a:extLst>
+              <a:ext uri="{FF2B5EF4-FFF2-40B4-BE49-F238E27FC236}">
+                <a16:creationId xmlns:a16="http://schemas.microsoft.com/office/drawing/2014/main" id="{7AE84055-CD81-4270-8B24-484DE0906C71}"/>
+              </a:ext>
+            </a:extLst>
+          </p:cNvPr>
+          <p:cNvSpPr txBox="1"/>
+          <p:nvPr/>
+        </p:nvSpPr>
+        <p:spPr>
+          <a:xfrm>
+            <a:off x="9282176" y="4410075"/>
+            <a:ext cx="1161152" cy="707886"/>
+          </a:xfrm>
+          <a:prstGeom prst="rect">
+            <a:avLst/>
+          </a:prstGeom>
+          <a:noFill/>
+        </p:spPr>
+        <p:txBody>
+          <a:bodyPr wrap="none" rtlCol="0">
+            <a:spAutoFit/>
+          </a:bodyPr>
+          <a:lstStyle/>
+          <a:p>
+            <a:pPr algn="ctr"/>
+            <a:r>
+              <a:rPr lang="en-US" sz="2400" b="1" u="sng" dirty="0">
+                <a:solidFill>
+                  <a:schemeClr val="accent4">
+                    <a:lumMod val="40000"/>
+                    <a:lumOff val="60000"/>
+                  </a:schemeClr>
+                </a:solidFill>
+              </a:rPr>
+              <a:t>Child</a:t>
+            </a:r>
+          </a:p>
+          <a:p>
+            <a:pPr algn="ctr"/>
+            <a:r>
+              <a:rPr lang="en-US" sz="1600" i="1" dirty="0">
+                <a:solidFill>
+                  <a:schemeClr val="bg1"/>
+                </a:solidFill>
+              </a:rPr>
+              <a:t>component</a:t>
+            </a:r>
+            <a:endParaRPr lang="pt-PT" sz="2400" i="1" dirty="0">
+              <a:solidFill>
+                <a:schemeClr val="bg1"/>
+              </a:solidFill>
+            </a:endParaRPr>
+          </a:p>
+        </p:txBody>
+      </p:sp>
+      <p:sp>
+        <p:nvSpPr>
+          <p:cNvPr id="16" name="CaixaDeTexto 15">
+            <a:extLst>
+              <a:ext uri="{FF2B5EF4-FFF2-40B4-BE49-F238E27FC236}">
+                <a16:creationId xmlns:a16="http://schemas.microsoft.com/office/drawing/2014/main" id="{6F32DAC6-A106-4460-AFA0-F65AF6DC48A3}"/>
+              </a:ext>
+            </a:extLst>
+          </p:cNvPr>
+          <p:cNvSpPr txBox="1"/>
+          <p:nvPr/>
+        </p:nvSpPr>
+        <p:spPr>
+          <a:xfrm>
+            <a:off x="7730721" y="4382232"/>
+            <a:ext cx="1244636" cy="338554"/>
+          </a:xfrm>
+          <a:prstGeom prst="rect">
+            <a:avLst/>
+          </a:prstGeom>
+          <a:noFill/>
+        </p:spPr>
+        <p:txBody>
+          <a:bodyPr wrap="none" rtlCol="0">
+            <a:spAutoFit/>
+          </a:bodyPr>
+          <a:lstStyle/>
+          <a:p>
+            <a:r>
+              <a:rPr lang="en-US" sz="1600" i="1" dirty="0">
+                <a:solidFill>
+                  <a:schemeClr val="bg1"/>
+                </a:solidFill>
+              </a:rPr>
+              <a:t>passing data</a:t>
+            </a:r>
+            <a:endParaRPr lang="pt-PT" sz="1600" i="1" dirty="0">
+              <a:solidFill>
+                <a:schemeClr val="bg1"/>
+              </a:solidFill>
+            </a:endParaRPr>
+          </a:p>
+        </p:txBody>
+      </p:sp>
+      <p:sp>
+        <p:nvSpPr>
+          <p:cNvPr id="17" name="CaixaDeTexto 16">
+            <a:extLst>
+              <a:ext uri="{FF2B5EF4-FFF2-40B4-BE49-F238E27FC236}">
+                <a16:creationId xmlns:a16="http://schemas.microsoft.com/office/drawing/2014/main" id="{702A294D-20D2-456E-A7C4-880882AFEEA4}"/>
+              </a:ext>
+            </a:extLst>
+          </p:cNvPr>
+          <p:cNvSpPr txBox="1"/>
+          <p:nvPr/>
+        </p:nvSpPr>
+        <p:spPr>
+          <a:xfrm>
+            <a:off x="7922152" y="5186248"/>
+            <a:ext cx="861774" cy="270267"/>
+          </a:xfrm>
+          <a:prstGeom prst="rect">
+            <a:avLst/>
+          </a:prstGeom>
+          <a:noFill/>
+        </p:spPr>
+        <p:txBody>
+          <a:bodyPr vert="eaVert" wrap="none" rtlCol="0">
+            <a:spAutoFit/>
+          </a:bodyPr>
+          <a:lstStyle/>
+          <a:p>
+            <a:r>
+              <a:rPr lang="en-US" sz="4400" dirty="0">
+                <a:solidFill>
+                  <a:schemeClr val="bg1"/>
+                </a:solidFill>
+              </a:rPr>
+              <a:t>}</a:t>
+            </a:r>
+            <a:endParaRPr lang="pt-PT" dirty="0">
+              <a:solidFill>
+                <a:schemeClr val="bg1"/>
+              </a:solidFill>
+            </a:endParaRPr>
+          </a:p>
+        </p:txBody>
+      </p:sp>
+      <p:sp>
+        <p:nvSpPr>
+          <p:cNvPr id="18" name="CaixaDeTexto 17">
+            <a:extLst>
+              <a:ext uri="{FF2B5EF4-FFF2-40B4-BE49-F238E27FC236}">
+                <a16:creationId xmlns:a16="http://schemas.microsoft.com/office/drawing/2014/main" id="{5B913E57-3B57-4314-9C5C-2C0E7343D954}"/>
+              </a:ext>
+            </a:extLst>
+          </p:cNvPr>
+          <p:cNvSpPr txBox="1"/>
+          <p:nvPr/>
+        </p:nvSpPr>
+        <p:spPr>
+          <a:xfrm>
+            <a:off x="6984747" y="5694078"/>
+            <a:ext cx="2736583" cy="369332"/>
+          </a:xfrm>
+          <a:prstGeom prst="rect">
+            <a:avLst/>
+          </a:prstGeom>
+          <a:noFill/>
+        </p:spPr>
+        <p:txBody>
+          <a:bodyPr wrap="none" rtlCol="0">
+            <a:spAutoFit/>
+          </a:bodyPr>
+          <a:lstStyle/>
+          <a:p>
+            <a:r>
+              <a:rPr lang="en-US" dirty="0">
+                <a:solidFill>
+                  <a:schemeClr val="bg1"/>
+                </a:solidFill>
+              </a:rPr>
+              <a:t>usage of </a:t>
+            </a:r>
+            <a:r>
+              <a:rPr lang="en-US" b="1" dirty="0">
+                <a:solidFill>
+                  <a:schemeClr val="bg1"/>
+                </a:solidFill>
+                <a:effectLst>
+                  <a:outerShdw blurRad="38100" dist="38100" dir="2700000" algn="tl">
+                    <a:srgbClr val="000000">
+                      <a:alpha val="43137"/>
+                    </a:srgbClr>
+                  </a:outerShdw>
+                </a:effectLst>
+                <a:highlight>
+                  <a:srgbClr val="3FBF70"/>
+                </a:highlight>
+              </a:rPr>
+              <a:t>callback functions</a:t>
+            </a:r>
+            <a:endParaRPr lang="pt-PT" b="1" dirty="0">
+              <a:solidFill>
+                <a:schemeClr val="bg1"/>
+              </a:solidFill>
+              <a:effectLst>
+                <a:outerShdw blurRad="38100" dist="38100" dir="2700000" algn="tl">
+                  <a:srgbClr val="000000">
+                    <a:alpha val="43137"/>
+                  </a:srgbClr>
+                </a:outerShdw>
+              </a:effectLst>
+              <a:highlight>
+                <a:srgbClr val="3FBF70"/>
+              </a:highlight>
+            </a:endParaRPr>
+          </a:p>
+        </p:txBody>
+      </p:sp>
+      <p:cxnSp>
+        <p:nvCxnSpPr>
+          <p:cNvPr id="19" name="Conexão reta unidirecional 18">
+            <a:extLst>
+              <a:ext uri="{FF2B5EF4-FFF2-40B4-BE49-F238E27FC236}">
+                <a16:creationId xmlns:a16="http://schemas.microsoft.com/office/drawing/2014/main" id="{A95A7AA6-828A-4EB3-87F4-02E02AA4FB68}"/>
+              </a:ext>
+            </a:extLst>
+          </p:cNvPr>
+          <p:cNvCxnSpPr>
+            <a:cxnSpLocks/>
+            <a:stCxn id="14" idx="1"/>
+            <a:endCxn id="13" idx="3"/>
+          </p:cNvCxnSpPr>
+          <p:nvPr/>
+        </p:nvCxnSpPr>
+        <p:spPr>
+          <a:xfrm flipH="1">
+            <a:off x="7423903" y="4764018"/>
+            <a:ext cx="1858273" cy="0"/>
+          </a:xfrm>
+          <a:prstGeom prst="straightConnector1">
+            <a:avLst/>
+          </a:prstGeom>
+          <a:ln w="76200">
+            <a:solidFill>
+              <a:srgbClr val="3FBF70"/>
+            </a:solidFill>
+            <a:tailEnd type="triangle"/>
+          </a:ln>
+        </p:spPr>
+        <p:style>
+          <a:lnRef idx="1">
+            <a:schemeClr val="accent1"/>
+          </a:lnRef>
+          <a:fillRef idx="0">
+            <a:schemeClr val="accent1"/>
+          </a:fillRef>
+          <a:effectRef idx="0">
+            <a:schemeClr val="accent1"/>
+          </a:effectRef>
+          <a:fontRef idx="minor">
+            <a:schemeClr val="tx1"/>
+          </a:fontRef>
+        </p:style>
+      </p:cxnSp>
     </p:spTree>
     <p:extLst>
       <p:ext uri="{BB962C8B-B14F-4D97-AF65-F5344CB8AC3E}">
@@ -8304,8 +9845,8 @@
         </p:nvSpPr>
         <p:spPr>
           <a:xfrm>
-            <a:off x="1121488" y="1795210"/>
-            <a:ext cx="1269707" cy="400110"/>
+            <a:off x="1256904" y="1613628"/>
+            <a:ext cx="1311385" cy="400110"/>
           </a:xfrm>
           <a:prstGeom prst="rect">
             <a:avLst/>
@@ -8331,7 +9872,7 @@
                   </a:outerShdw>
                 </a:effectLst>
               </a:rPr>
-              <a:t>Tic tac toe</a:t>
+              <a:t>Tic-tac-toe</a:t>
             </a:r>
             <a:endParaRPr lang="pt-PT" sz="2000" b="1" dirty="0">
               <a:solidFill>
@@ -8383,10 +9924,10 @@
       </p:grpSpPr>
       <p:sp>
         <p:nvSpPr>
-          <p:cNvPr id="2" name="Título 1">
+          <p:cNvPr id="2" name="Title 1">
             <a:extLst>
               <a:ext uri="{FF2B5EF4-FFF2-40B4-BE49-F238E27FC236}">
-                <a16:creationId xmlns:a16="http://schemas.microsoft.com/office/drawing/2014/main" id="{EE9E4848-E60C-4ED9-9FE9-040DD00B78E2}"/>
+                <a16:creationId xmlns:a16="http://schemas.microsoft.com/office/drawing/2014/main" id="{712BBEBA-BC94-4022-A529-082895C94004}"/>
               </a:ext>
             </a:extLst>
           </p:cNvPr>
@@ -8411,7 +9952,6 @@
               </a:rPr>
               <a:t>Code examples</a:t>
             </a:r>
-            <a:endParaRPr lang="pt-PT" dirty="0"/>
           </a:p>
         </p:txBody>
       </p:sp>
@@ -8420,7 +9960,7 @@
           <p:cNvPr id="4" name="CaixaDeTexto 3">
             <a:extLst>
               <a:ext uri="{FF2B5EF4-FFF2-40B4-BE49-F238E27FC236}">
-                <a16:creationId xmlns:a16="http://schemas.microsoft.com/office/drawing/2014/main" id="{1A14E176-5312-4B64-A6E5-B324D0F4C198}"/>
+                <a16:creationId xmlns:a16="http://schemas.microsoft.com/office/drawing/2014/main" id="{F5CEBF9C-5BE0-4BC6-A7C5-D88F2C8419EB}"/>
               </a:ext>
             </a:extLst>
           </p:cNvPr>
@@ -8459,7 +9999,7 @@
                   <a:srgbClr val="008080"/>
                 </a:highlight>
               </a:rPr>
-              <a:t>2</a:t>
+              <a:t>1</a:t>
             </a:r>
             <a:endParaRPr lang="pt-PT" b="1" dirty="0">
               <a:solidFill>
@@ -8481,10 +10021,10 @@
       </p:sp>
       <p:sp>
         <p:nvSpPr>
-          <p:cNvPr id="5" name="CaixaDeTexto 4">
+          <p:cNvPr id="40" name="CaixaDeTexto 39">
             <a:extLst>
               <a:ext uri="{FF2B5EF4-FFF2-40B4-BE49-F238E27FC236}">
-                <a16:creationId xmlns:a16="http://schemas.microsoft.com/office/drawing/2014/main" id="{7431F35D-7438-4FD4-8CE3-59485A38A577}"/>
+                <a16:creationId xmlns:a16="http://schemas.microsoft.com/office/drawing/2014/main" id="{A3638077-DE35-4FB8-84DF-A01C51CC4FA5}"/>
               </a:ext>
             </a:extLst>
           </p:cNvPr>
@@ -8493,8 +10033,8 @@
         </p:nvSpPr>
         <p:spPr>
           <a:xfrm>
-            <a:off x="1121488" y="1795210"/>
-            <a:ext cx="1269707" cy="400110"/>
+            <a:off x="1256904" y="1613628"/>
+            <a:ext cx="1311385" cy="400110"/>
           </a:xfrm>
           <a:prstGeom prst="rect">
             <a:avLst/>
@@ -8520,7 +10060,7 @@
                   </a:outerShdw>
                 </a:effectLst>
               </a:rPr>
-              <a:t>Tic tac toe</a:t>
+              <a:t>Tic-tac-toe</a:t>
             </a:r>
             <a:endParaRPr lang="pt-PT" sz="2000" b="1" dirty="0">
               <a:solidFill>
@@ -8540,13 +10080,16 @@
     </p:spTree>
     <p:extLst>
       <p:ext uri="{BB962C8B-B14F-4D97-AF65-F5344CB8AC3E}">
-        <p14:creationId xmlns:p14="http://schemas.microsoft.com/office/powerpoint/2010/main" val="3254461497"/>
+        <p14:creationId xmlns:p14="http://schemas.microsoft.com/office/powerpoint/2010/main" val="2340521043"/>
       </p:ext>
     </p:extLst>
   </p:cSld>
   <p:clrMapOvr>
     <a:masterClrMapping/>
   </p:clrMapOvr>
+  <p:transition spd="slow">
+    <p:push dir="u"/>
+  </p:transition>
 </p:sld>
 </file>
 

</xml_diff>